<commit_message>
add 1 song, update 1 song
</commit_message>
<xml_diff>
--- a/CN.pptx
+++ b/CN.pptx
@@ -5,7 +5,7 @@
     <p:sldMasterId id="2147483660" r:id="rId1"/>
   </p:sldMasterIdLst>
   <p:notesMasterIdLst>
-    <p:notesMasterId r:id="rId82"/>
+    <p:notesMasterId r:id="rId98"/>
   </p:notesMasterIdLst>
   <p:sldIdLst>
     <p:sldId id="307" r:id="rId2"/>
@@ -78,16 +78,32 @@
     <p:sldId id="4788" r:id="rId69"/>
     <p:sldId id="4795" r:id="rId70"/>
     <p:sldId id="4796" r:id="rId71"/>
-    <p:sldId id="4588" r:id="rId72"/>
-    <p:sldId id="4537" r:id="rId73"/>
-    <p:sldId id="4797" r:id="rId74"/>
-    <p:sldId id="4619" r:id="rId75"/>
-    <p:sldId id="4502" r:id="rId76"/>
-    <p:sldId id="4503" r:id="rId77"/>
-    <p:sldId id="4504" r:id="rId78"/>
-    <p:sldId id="4505" r:id="rId79"/>
-    <p:sldId id="4506" r:id="rId80"/>
-    <p:sldId id="4507" r:id="rId81"/>
+    <p:sldId id="4816" r:id="rId72"/>
+    <p:sldId id="4817" r:id="rId73"/>
+    <p:sldId id="4818" r:id="rId74"/>
+    <p:sldId id="4819" r:id="rId75"/>
+    <p:sldId id="4820" r:id="rId76"/>
+    <p:sldId id="4821" r:id="rId77"/>
+    <p:sldId id="4822" r:id="rId78"/>
+    <p:sldId id="4823" r:id="rId79"/>
+    <p:sldId id="4824" r:id="rId80"/>
+    <p:sldId id="4825" r:id="rId81"/>
+    <p:sldId id="4826" r:id="rId82"/>
+    <p:sldId id="4827" r:id="rId83"/>
+    <p:sldId id="4828" r:id="rId84"/>
+    <p:sldId id="4829" r:id="rId85"/>
+    <p:sldId id="4830" r:id="rId86"/>
+    <p:sldId id="4831" r:id="rId87"/>
+    <p:sldId id="4588" r:id="rId88"/>
+    <p:sldId id="4537" r:id="rId89"/>
+    <p:sldId id="4797" r:id="rId90"/>
+    <p:sldId id="4619" r:id="rId91"/>
+    <p:sldId id="4502" r:id="rId92"/>
+    <p:sldId id="4503" r:id="rId93"/>
+    <p:sldId id="4504" r:id="rId94"/>
+    <p:sldId id="4505" r:id="rId95"/>
+    <p:sldId id="4506" r:id="rId96"/>
+    <p:sldId id="4507" r:id="rId97"/>
   </p:sldIdLst>
   <p:sldSz cx="9144000" cy="6858000" type="screen4x3"/>
   <p:notesSz cx="6858000" cy="9144000"/>
@@ -188,7 +204,7 @@
   </p:defaultTextStyle>
   <p:extLst>
     <p:ext uri="{EFAFB233-063F-42B5-8137-9DF3F51BA10A}">
-      <p15:sldGuideLst xmlns:p15="http://schemas.microsoft.com/office/powerpoint/2012/main">
+      <p15:sldGuideLst xmlns:p15="http://schemas.microsoft.com/office/powerpoint/2012/main" xmlns="">
         <p15:guide id="1" orient="horz" pos="2160">
           <p15:clr>
             <a:srgbClr val="A4A3A4"/>
@@ -3997,6 +4013,13 @@
   <p:clrMapOvr>
     <a:masterClrMapping/>
   </p:clrMapOvr>
+  <p:timing>
+    <p:tnLst>
+      <p:par>
+        <p:cTn id="1" dur="indefinite" restart="never" nodeType="tmRoot"/>
+      </p:par>
+    </p:tnLst>
+  </p:timing>
 </p:sld>
 </file>
 
@@ -4205,6 +4228,13 @@
   <p:clrMapOvr>
     <a:masterClrMapping/>
   </p:clrMapOvr>
+  <p:timing>
+    <p:tnLst>
+      <p:par>
+        <p:cTn id="1" dur="indefinite" restart="never" nodeType="tmRoot"/>
+      </p:par>
+    </p:tnLst>
+  </p:timing>
 </p:sld>
 </file>
 
@@ -4474,6 +4504,13 @@
   <p:clrMapOvr>
     <a:masterClrMapping/>
   </p:clrMapOvr>
+  <p:timing>
+    <p:tnLst>
+      <p:par>
+        <p:cTn id="1" dur="indefinite" restart="never" nodeType="tmRoot"/>
+      </p:par>
+    </p:tnLst>
+  </p:timing>
 </p:sld>
 </file>
 
@@ -4722,6 +4759,13 @@
   <p:clrMapOvr>
     <a:masterClrMapping/>
   </p:clrMapOvr>
+  <p:timing>
+    <p:tnLst>
+      <p:par>
+        <p:cTn id="1" dur="indefinite" restart="never" nodeType="tmRoot"/>
+      </p:par>
+    </p:tnLst>
+  </p:timing>
 </p:sld>
 </file>
 
@@ -5066,6 +5110,13 @@
   <p:clrMapOvr>
     <a:masterClrMapping/>
   </p:clrMapOvr>
+  <p:timing>
+    <p:tnLst>
+      <p:par>
+        <p:cTn id="1" dur="indefinite" restart="never" nodeType="tmRoot"/>
+      </p:par>
+    </p:tnLst>
+  </p:timing>
 </p:sld>
 </file>
 
@@ -5415,6 +5466,13 @@
   <p:clrMapOvr>
     <a:masterClrMapping/>
   </p:clrMapOvr>
+  <p:timing>
+    <p:tnLst>
+      <p:par>
+        <p:cTn id="1" dur="indefinite" restart="never" nodeType="tmRoot"/>
+      </p:par>
+    </p:tnLst>
+  </p:timing>
 </p:sld>
 </file>
 
@@ -5631,6 +5689,13 @@
   <p:clrMapOvr>
     <a:masterClrMapping/>
   </p:clrMapOvr>
+  <p:timing>
+    <p:tnLst>
+      <p:par>
+        <p:cTn id="1" dur="indefinite" restart="never" nodeType="tmRoot"/>
+      </p:par>
+    </p:tnLst>
+  </p:timing>
 </p:sld>
 </file>
 
@@ -5883,6 +5948,13 @@
   <p:clrMapOvr>
     <a:masterClrMapping/>
   </p:clrMapOvr>
+  <p:timing>
+    <p:tnLst>
+      <p:par>
+        <p:cTn id="1" dur="indefinite" restart="never" nodeType="tmRoot"/>
+      </p:par>
+    </p:tnLst>
+  </p:timing>
 </p:sld>
 </file>
 
@@ -5976,6 +6048,13 @@
   <p:clrMapOvr>
     <a:masterClrMapping/>
   </p:clrMapOvr>
+  <p:timing>
+    <p:tnLst>
+      <p:par>
+        <p:cTn id="1" dur="indefinite" restart="never" nodeType="tmRoot"/>
+      </p:par>
+    </p:tnLst>
+  </p:timing>
 </p:sld>
 </file>
 
@@ -6108,6 +6187,13 @@
   <p:clrMapOvr>
     <a:masterClrMapping/>
   </p:clrMapOvr>
+  <p:timing>
+    <p:tnLst>
+      <p:par>
+        <p:cTn id="1" dur="indefinite" restart="never" nodeType="tmRoot"/>
+      </p:par>
+    </p:tnLst>
+  </p:timing>
 </p:sld>
 </file>
 
@@ -6234,6 +6320,13 @@
   <p:clrMapOvr>
     <a:masterClrMapping/>
   </p:clrMapOvr>
+  <p:timing>
+    <p:tnLst>
+      <p:par>
+        <p:cTn id="1" dur="indefinite" restart="never" nodeType="tmRoot"/>
+      </p:par>
+    </p:tnLst>
+  </p:timing>
 </p:sld>
 </file>
 
@@ -6312,6 +6405,13 @@
   <p:clrMapOvr>
     <a:masterClrMapping/>
   </p:clrMapOvr>
+  <p:timing>
+    <p:tnLst>
+      <p:par>
+        <p:cTn id="1" dur="indefinite" restart="never" nodeType="tmRoot"/>
+      </p:par>
+    </p:tnLst>
+  </p:timing>
 </p:sld>
 </file>
 
@@ -6421,6 +6521,13 @@
   <p:clrMapOvr>
     <a:masterClrMapping/>
   </p:clrMapOvr>
+  <p:timing>
+    <p:tnLst>
+      <p:par>
+        <p:cTn id="1" dur="indefinite" restart="never" nodeType="tmRoot"/>
+      </p:par>
+    </p:tnLst>
+  </p:timing>
 </p:sld>
 </file>
 
@@ -6446,7 +6553,7 @@
           <p:cNvPr id="2" name="Title 1">
             <a:extLst>
               <a:ext uri="{FF2B5EF4-FFF2-40B4-BE49-F238E27FC236}">
-                <a16:creationId xmlns:a16="http://schemas.microsoft.com/office/drawing/2014/main" id="{CF08130F-DA6D-4D19-B10C-D85018F22187}"/>
+                <a16:creationId xmlns:a16="http://schemas.microsoft.com/office/drawing/2014/main" xmlns="" id="{CF08130F-DA6D-4D19-B10C-D85018F22187}"/>
               </a:ext>
             </a:extLst>
           </p:cNvPr>
@@ -6471,7 +6578,7 @@
           <p:cNvPr id="3" name="Content Placeholder 2">
             <a:extLst>
               <a:ext uri="{FF2B5EF4-FFF2-40B4-BE49-F238E27FC236}">
-                <a16:creationId xmlns:a16="http://schemas.microsoft.com/office/drawing/2014/main" id="{5B67FD08-5E99-410D-AAB1-55A312F1BB99}"/>
+                <a16:creationId xmlns:a16="http://schemas.microsoft.com/office/drawing/2014/main" xmlns="" id="{5B67FD08-5E99-410D-AAB1-55A312F1BB99}"/>
               </a:ext>
             </a:extLst>
           </p:cNvPr>
@@ -6501,6 +6608,13 @@
   <p:clrMapOvr>
     <a:masterClrMapping/>
   </p:clrMapOvr>
+  <p:timing>
+    <p:tnLst>
+      <p:par>
+        <p:cTn id="1" dur="indefinite" restart="never" nodeType="tmRoot"/>
+      </p:par>
+    </p:tnLst>
+  </p:timing>
 </p:sld>
 </file>
 
@@ -6619,6 +6733,13 @@
     <a:masterClrMapping/>
   </p:clrMapOvr>
   <p:transition/>
+  <p:timing>
+    <p:tnLst>
+      <p:par>
+        <p:cTn id="1" dur="indefinite" restart="never" nodeType="tmRoot"/>
+      </p:par>
+    </p:tnLst>
+  </p:timing>
 </p:sld>
 </file>
 
@@ -6737,6 +6858,13 @@
     <a:masterClrMapping/>
   </p:clrMapOvr>
   <p:transition/>
+  <p:timing>
+    <p:tnLst>
+      <p:par>
+        <p:cTn id="1" dur="indefinite" restart="never" nodeType="tmRoot"/>
+      </p:par>
+    </p:tnLst>
+  </p:timing>
 </p:sld>
 </file>
 
@@ -6855,6 +6983,13 @@
     <a:masterClrMapping/>
   </p:clrMapOvr>
   <p:transition/>
+  <p:timing>
+    <p:tnLst>
+      <p:par>
+        <p:cTn id="1" dur="indefinite" restart="never" nodeType="tmRoot"/>
+      </p:par>
+    </p:tnLst>
+  </p:timing>
 </p:sld>
 </file>
 
@@ -6973,6 +7108,13 @@
     <a:masterClrMapping/>
   </p:clrMapOvr>
   <p:transition/>
+  <p:timing>
+    <p:tnLst>
+      <p:par>
+        <p:cTn id="1" dur="indefinite" restart="never" nodeType="tmRoot"/>
+      </p:par>
+    </p:tnLst>
+  </p:timing>
 </p:sld>
 </file>
 
@@ -7091,6 +7233,13 @@
     <a:masterClrMapping/>
   </p:clrMapOvr>
   <p:transition/>
+  <p:timing>
+    <p:tnLst>
+      <p:par>
+        <p:cTn id="1" dur="indefinite" restart="never" nodeType="tmRoot"/>
+      </p:par>
+    </p:tnLst>
+  </p:timing>
 </p:sld>
 </file>
 
@@ -7220,6 +7369,13 @@
     <a:masterClrMapping/>
   </p:clrMapOvr>
   <p:transition/>
+  <p:timing>
+    <p:tnLst>
+      <p:par>
+        <p:cTn id="1" dur="indefinite" restart="never" nodeType="tmRoot"/>
+      </p:par>
+    </p:tnLst>
+  </p:timing>
 </p:sld>
 </file>
 
@@ -7245,7 +7401,7 @@
           <p:cNvPr id="2" name="Title 1">
             <a:extLst>
               <a:ext uri="{FF2B5EF4-FFF2-40B4-BE49-F238E27FC236}">
-                <a16:creationId xmlns:a16="http://schemas.microsoft.com/office/drawing/2014/main" id="{FC78445F-18CC-403C-BE0F-337DE12047E0}"/>
+                <a16:creationId xmlns:a16="http://schemas.microsoft.com/office/drawing/2014/main" xmlns="" id="{FC78445F-18CC-403C-BE0F-337DE12047E0}"/>
               </a:ext>
             </a:extLst>
           </p:cNvPr>
@@ -7270,7 +7426,7 @@
           <p:cNvPr id="3" name="Content Placeholder 2">
             <a:extLst>
               <a:ext uri="{FF2B5EF4-FFF2-40B4-BE49-F238E27FC236}">
-                <a16:creationId xmlns:a16="http://schemas.microsoft.com/office/drawing/2014/main" id="{1BF46068-8E2C-4608-B732-CD57D295FE91}"/>
+                <a16:creationId xmlns:a16="http://schemas.microsoft.com/office/drawing/2014/main" xmlns="" id="{1BF46068-8E2C-4608-B732-CD57D295FE91}"/>
               </a:ext>
             </a:extLst>
           </p:cNvPr>
@@ -7300,6 +7456,13 @@
   <p:clrMapOvr>
     <a:masterClrMapping/>
   </p:clrMapOvr>
+  <p:timing>
+    <p:tnLst>
+      <p:par>
+        <p:cTn id="1" dur="indefinite" restart="never" nodeType="tmRoot"/>
+      </p:par>
+    </p:tnLst>
+  </p:timing>
 </p:sld>
 </file>
 
@@ -7981,6 +8144,13 @@
     <a:masterClrMapping/>
   </p:clrMapOvr>
   <p:transition/>
+  <p:timing>
+    <p:tnLst>
+      <p:par>
+        <p:cTn id="1" dur="indefinite" restart="never" nodeType="tmRoot"/>
+      </p:par>
+    </p:tnLst>
+  </p:timing>
 </p:sld>
 </file>
 
@@ -8047,6 +8217,13 @@
   <p:clrMapOvr>
     <a:masterClrMapping/>
   </p:clrMapOvr>
+  <p:timing>
+    <p:tnLst>
+      <p:par>
+        <p:cTn id="1" dur="indefinite" restart="never" nodeType="tmRoot"/>
+      </p:par>
+    </p:tnLst>
+  </p:timing>
 </p:sld>
 </file>
 
@@ -8476,6 +8653,13 @@
     <a:masterClrMapping/>
   </p:clrMapOvr>
   <p:transition/>
+  <p:timing>
+    <p:tnLst>
+      <p:par>
+        <p:cTn id="1" dur="indefinite" restart="never" nodeType="tmRoot"/>
+      </p:par>
+    </p:tnLst>
+  </p:timing>
 </p:sld>
 </file>
 
@@ -8898,6 +9082,13 @@
     <a:masterClrMapping/>
   </p:clrMapOvr>
   <p:transition/>
+  <p:timing>
+    <p:tnLst>
+      <p:par>
+        <p:cTn id="1" dur="indefinite" restart="never" nodeType="tmRoot"/>
+      </p:par>
+    </p:tnLst>
+  </p:timing>
 </p:sld>
 </file>
 
@@ -9002,6 +9193,13 @@
     <a:masterClrMapping/>
   </p:clrMapOvr>
   <p:transition/>
+  <p:timing>
+    <p:tnLst>
+      <p:par>
+        <p:cTn id="1" dur="indefinite" restart="never" nodeType="tmRoot"/>
+      </p:par>
+    </p:tnLst>
+  </p:timing>
 </p:sld>
 </file>
 
@@ -9334,6 +9532,13 @@
     <a:masterClrMapping/>
   </p:clrMapOvr>
   <p:transition/>
+  <p:timing>
+    <p:tnLst>
+      <p:par>
+        <p:cTn id="1" dur="indefinite" restart="never" nodeType="tmRoot"/>
+      </p:par>
+    </p:tnLst>
+  </p:timing>
 </p:sld>
 </file>
 
@@ -9889,6 +10094,13 @@
     <a:masterClrMapping/>
   </p:clrMapOvr>
   <p:transition/>
+  <p:timing>
+    <p:tnLst>
+      <p:par>
+        <p:cTn id="1" dur="indefinite" restart="never" nodeType="tmRoot"/>
+      </p:par>
+    </p:tnLst>
+  </p:timing>
 </p:sld>
 </file>
 
@@ -10051,6 +10263,13 @@
     <a:masterClrMapping/>
   </p:clrMapOvr>
   <p:transition/>
+  <p:timing>
+    <p:tnLst>
+      <p:par>
+        <p:cTn id="1" dur="indefinite" restart="never" nodeType="tmRoot"/>
+      </p:par>
+    </p:tnLst>
+  </p:timing>
 </p:sld>
 </file>
 
@@ -10213,6 +10432,13 @@
     <a:masterClrMapping/>
   </p:clrMapOvr>
   <p:transition/>
+  <p:timing>
+    <p:tnLst>
+      <p:par>
+        <p:cTn id="1" dur="indefinite" restart="never" nodeType="tmRoot"/>
+      </p:par>
+    </p:tnLst>
+  </p:timing>
 </p:sld>
 </file>
 
@@ -10381,6 +10607,13 @@
     <a:masterClrMapping/>
   </p:clrMapOvr>
   <p:transition/>
+  <p:timing>
+    <p:tnLst>
+      <p:par>
+        <p:cTn id="1" dur="indefinite" restart="never" nodeType="tmRoot"/>
+      </p:par>
+    </p:tnLst>
+  </p:timing>
 </p:sld>
 </file>
 
@@ -10549,6 +10782,13 @@
     <a:masterClrMapping/>
   </p:clrMapOvr>
   <p:transition/>
+  <p:timing>
+    <p:tnLst>
+      <p:par>
+        <p:cTn id="1" dur="indefinite" restart="never" nodeType="tmRoot"/>
+      </p:par>
+    </p:tnLst>
+  </p:timing>
 </p:sld>
 </file>
 
@@ -10574,7 +10814,7 @@
           <p:cNvPr id="2" name="Title 1">
             <a:extLst>
               <a:ext uri="{FF2B5EF4-FFF2-40B4-BE49-F238E27FC236}">
-                <a16:creationId xmlns:a16="http://schemas.microsoft.com/office/drawing/2014/main" id="{08D31379-ACD3-4F64-81B8-4A99E4368891}"/>
+                <a16:creationId xmlns:a16="http://schemas.microsoft.com/office/drawing/2014/main" xmlns="" id="{08D31379-ACD3-4F64-81B8-4A99E4368891}"/>
               </a:ext>
             </a:extLst>
           </p:cNvPr>
@@ -10599,7 +10839,7 @@
           <p:cNvPr id="3" name="Content Placeholder 2">
             <a:extLst>
               <a:ext uri="{FF2B5EF4-FFF2-40B4-BE49-F238E27FC236}">
-                <a16:creationId xmlns:a16="http://schemas.microsoft.com/office/drawing/2014/main" id="{F8A58A9A-86A3-41B1-BC98-149DA527DE8B}"/>
+                <a16:creationId xmlns:a16="http://schemas.microsoft.com/office/drawing/2014/main" xmlns="" id="{F8A58A9A-86A3-41B1-BC98-149DA527DE8B}"/>
               </a:ext>
             </a:extLst>
           </p:cNvPr>
@@ -10629,6 +10869,13 @@
   <p:clrMapOvr>
     <a:masterClrMapping/>
   </p:clrMapOvr>
+  <p:timing>
+    <p:tnLst>
+      <p:par>
+        <p:cTn id="1" dur="indefinite" restart="never" nodeType="tmRoot"/>
+      </p:par>
+    </p:tnLst>
+  </p:timing>
 </p:sld>
 </file>
 
@@ -10695,6 +10942,13 @@
   <p:clrMapOvr>
     <a:masterClrMapping/>
   </p:clrMapOvr>
+  <p:timing>
+    <p:tnLst>
+      <p:par>
+        <p:cTn id="1" dur="indefinite" restart="never" nodeType="tmRoot"/>
+      </p:par>
+    </p:tnLst>
+  </p:timing>
 </p:sld>
 </file>
 
@@ -11376,6 +11630,13 @@
     <a:masterClrMapping/>
   </p:clrMapOvr>
   <p:transition/>
+  <p:timing>
+    <p:tnLst>
+      <p:par>
+        <p:cTn id="1" dur="indefinite" restart="never" nodeType="tmRoot"/>
+      </p:par>
+    </p:tnLst>
+  </p:timing>
 </p:sld>
 </file>
 
@@ -11805,6 +12066,13 @@
     <a:masterClrMapping/>
   </p:clrMapOvr>
   <p:transition/>
+  <p:timing>
+    <p:tnLst>
+      <p:par>
+        <p:cTn id="1" dur="indefinite" restart="never" nodeType="tmRoot"/>
+      </p:par>
+    </p:tnLst>
+  </p:timing>
 </p:sld>
 </file>
 
@@ -12227,6 +12495,13 @@
     <a:masterClrMapping/>
   </p:clrMapOvr>
   <p:transition/>
+  <p:timing>
+    <p:tnLst>
+      <p:par>
+        <p:cTn id="1" dur="indefinite" restart="never" nodeType="tmRoot"/>
+      </p:par>
+    </p:tnLst>
+  </p:timing>
 </p:sld>
 </file>
 
@@ -12880,6 +13155,13 @@
     <a:masterClrMapping/>
   </p:clrMapOvr>
   <p:transition/>
+  <p:timing>
+    <p:tnLst>
+      <p:par>
+        <p:cTn id="1" dur="indefinite" restart="never" nodeType="tmRoot"/>
+      </p:par>
+    </p:tnLst>
+  </p:timing>
 </p:sld>
 </file>
 
@@ -13309,6 +13591,13 @@
     <a:masterClrMapping/>
   </p:clrMapOvr>
   <p:transition/>
+  <p:timing>
+    <p:tnLst>
+      <p:par>
+        <p:cTn id="1" dur="indefinite" restart="never" nodeType="tmRoot"/>
+      </p:par>
+    </p:tnLst>
+  </p:timing>
 </p:sld>
 </file>
 
@@ -13731,6 +14020,13 @@
     <a:masterClrMapping/>
   </p:clrMapOvr>
   <p:transition/>
+  <p:timing>
+    <p:tnLst>
+      <p:par>
+        <p:cTn id="1" dur="indefinite" restart="never" nodeType="tmRoot"/>
+      </p:par>
+    </p:tnLst>
+  </p:timing>
 </p:sld>
 </file>
 
@@ -13835,6 +14131,13 @@
     <a:masterClrMapping/>
   </p:clrMapOvr>
   <p:transition/>
+  <p:timing>
+    <p:tnLst>
+      <p:par>
+        <p:cTn id="1" dur="indefinite" restart="never" nodeType="tmRoot"/>
+      </p:par>
+    </p:tnLst>
+  </p:timing>
 </p:sld>
 </file>
 
@@ -14167,6 +14470,13 @@
     <a:masterClrMapping/>
   </p:clrMapOvr>
   <p:transition/>
+  <p:timing>
+    <p:tnLst>
+      <p:par>
+        <p:cTn id="1" dur="indefinite" restart="never" nodeType="tmRoot"/>
+      </p:par>
+    </p:tnLst>
+  </p:timing>
 </p:sld>
 </file>
 
@@ -14708,6 +15018,13 @@
     <a:masterClrMapping/>
   </p:clrMapOvr>
   <p:transition/>
+  <p:timing>
+    <p:tnLst>
+      <p:par>
+        <p:cTn id="1" dur="indefinite" restart="never" nodeType="tmRoot"/>
+      </p:par>
+    </p:tnLst>
+  </p:timing>
 </p:sld>
 </file>
 
@@ -15263,6 +15580,13 @@
     <a:masterClrMapping/>
   </p:clrMapOvr>
   <p:transition/>
+  <p:timing>
+    <p:tnLst>
+      <p:par>
+        <p:cTn id="1" dur="indefinite" restart="never" nodeType="tmRoot"/>
+      </p:par>
+    </p:tnLst>
+  </p:timing>
 </p:sld>
 </file>
 
@@ -15329,6 +15653,13 @@
   <p:clrMapOvr>
     <a:masterClrMapping/>
   </p:clrMapOvr>
+  <p:timing>
+    <p:tnLst>
+      <p:par>
+        <p:cTn id="1" dur="indefinite" restart="never" nodeType="tmRoot"/>
+      </p:par>
+    </p:tnLst>
+  </p:timing>
 </p:sld>
 </file>
 
@@ -15912,6 +16243,13 @@
     <a:masterClrMapping/>
   </p:clrMapOvr>
   <p:transition/>
+  <p:timing>
+    <p:tnLst>
+      <p:par>
+        <p:cTn id="1" dur="indefinite" restart="never" nodeType="tmRoot"/>
+      </p:par>
+    </p:tnLst>
+  </p:timing>
 </p:sld>
 </file>
 
@@ -16467,6 +16805,13 @@
     <a:masterClrMapping/>
   </p:clrMapOvr>
   <p:transition/>
+  <p:timing>
+    <p:tnLst>
+      <p:par>
+        <p:cTn id="1" dur="indefinite" restart="never" nodeType="tmRoot"/>
+      </p:par>
+    </p:tnLst>
+  </p:timing>
 </p:sld>
 </file>
 
@@ -16586,6 +16931,13 @@
     <a:masterClrMapping/>
   </p:clrMapOvr>
   <p:transition/>
+  <p:timing>
+    <p:tnLst>
+      <p:par>
+        <p:cTn id="1" dur="indefinite" restart="never" nodeType="tmRoot"/>
+      </p:par>
+    </p:tnLst>
+  </p:timing>
 </p:sld>
 </file>
 
@@ -16748,6 +17100,13 @@
     <a:masterClrMapping/>
   </p:clrMapOvr>
   <p:transition/>
+  <p:timing>
+    <p:tnLst>
+      <p:par>
+        <p:cTn id="1" dur="indefinite" restart="never" nodeType="tmRoot"/>
+      </p:par>
+    </p:tnLst>
+  </p:timing>
 </p:sld>
 </file>
 
@@ -16910,6 +17269,13 @@
     <a:masterClrMapping/>
   </p:clrMapOvr>
   <p:transition/>
+  <p:timing>
+    <p:tnLst>
+      <p:par>
+        <p:cTn id="1" dur="indefinite" restart="never" nodeType="tmRoot"/>
+      </p:par>
+    </p:tnLst>
+  </p:timing>
 </p:sld>
 </file>
 
@@ -17072,6 +17438,13 @@
     <a:masterClrMapping/>
   </p:clrMapOvr>
   <p:transition/>
+  <p:timing>
+    <p:tnLst>
+      <p:par>
+        <p:cTn id="1" dur="indefinite" restart="never" nodeType="tmRoot"/>
+      </p:par>
+    </p:tnLst>
+  </p:timing>
 </p:sld>
 </file>
 
@@ -17234,6 +17607,13 @@
     <a:masterClrMapping/>
   </p:clrMapOvr>
   <p:transition/>
+  <p:timing>
+    <p:tnLst>
+      <p:par>
+        <p:cTn id="1" dur="indefinite" restart="never" nodeType="tmRoot"/>
+      </p:par>
+    </p:tnLst>
+  </p:timing>
 </p:sld>
 </file>
 
@@ -17793,6 +18173,13 @@
   <p:clrMapOvr>
     <a:masterClrMapping/>
   </p:clrMapOvr>
+  <p:timing>
+    <p:tnLst>
+      <p:par>
+        <p:cTn id="1" dur="indefinite" restart="never" nodeType="tmRoot"/>
+      </p:par>
+    </p:tnLst>
+  </p:timing>
 </p:sld>
 </file>
 
@@ -18117,6 +18504,13 @@
     <a:masterClrMapping/>
   </p:clrMapOvr>
   <p:transition/>
+  <p:timing>
+    <p:tnLst>
+      <p:par>
+        <p:cTn id="1" dur="indefinite" restart="never" nodeType="tmRoot"/>
+      </p:par>
+    </p:tnLst>
+  </p:timing>
 </p:sld>
 </file>
 
@@ -18279,6 +18673,13 @@
     <a:masterClrMapping/>
   </p:clrMapOvr>
   <p:transition/>
+  <p:timing>
+    <p:tnLst>
+      <p:par>
+        <p:cTn id="1" dur="indefinite" restart="never" nodeType="tmRoot"/>
+      </p:par>
+    </p:tnLst>
+  </p:timing>
 </p:sld>
 </file>
 
@@ -18441,6 +18842,13 @@
     <a:masterClrMapping/>
   </p:clrMapOvr>
   <p:transition/>
+  <p:timing>
+    <p:tnLst>
+      <p:par>
+        <p:cTn id="1" dur="indefinite" restart="never" nodeType="tmRoot"/>
+      </p:par>
+    </p:tnLst>
+  </p:timing>
 </p:sld>
 </file>
 
@@ -18603,6 +19011,13 @@
     <a:masterClrMapping/>
   </p:clrMapOvr>
   <p:transition/>
+  <p:timing>
+    <p:tnLst>
+      <p:par>
+        <p:cTn id="1" dur="indefinite" restart="never" nodeType="tmRoot"/>
+      </p:par>
+    </p:tnLst>
+  </p:timing>
 </p:sld>
 </file>
 
@@ -18765,6 +19180,13 @@
     <a:masterClrMapping/>
   </p:clrMapOvr>
   <p:transition/>
+  <p:timing>
+    <p:tnLst>
+      <p:par>
+        <p:cTn id="1" dur="indefinite" restart="never" nodeType="tmRoot"/>
+      </p:par>
+    </p:tnLst>
+  </p:timing>
 </p:sld>
 </file>
 
@@ -18927,6 +19349,13 @@
     <a:masterClrMapping/>
   </p:clrMapOvr>
   <p:transition/>
+  <p:timing>
+    <p:tnLst>
+      <p:par>
+        <p:cTn id="1" dur="indefinite" restart="never" nodeType="tmRoot"/>
+      </p:par>
+    </p:tnLst>
+  </p:timing>
 </p:sld>
 </file>
 
@@ -19089,6 +19518,13 @@
     <a:masterClrMapping/>
   </p:clrMapOvr>
   <p:transition/>
+  <p:timing>
+    <p:tnLst>
+      <p:par>
+        <p:cTn id="1" dur="indefinite" restart="never" nodeType="tmRoot"/>
+      </p:par>
+    </p:tnLst>
+  </p:timing>
 </p:sld>
 </file>
 
@@ -19251,6 +19687,13 @@
     <a:masterClrMapping/>
   </p:clrMapOvr>
   <p:transition/>
+  <p:timing>
+    <p:tnLst>
+      <p:par>
+        <p:cTn id="1" dur="indefinite" restart="never" nodeType="tmRoot"/>
+      </p:par>
+    </p:tnLst>
+  </p:timing>
 </p:sld>
 </file>
 
@@ -19413,6 +19856,13 @@
     <a:masterClrMapping/>
   </p:clrMapOvr>
   <p:transition/>
+  <p:timing>
+    <p:tnLst>
+      <p:par>
+        <p:cTn id="1" dur="indefinite" restart="never" nodeType="tmRoot"/>
+      </p:par>
+    </p:tnLst>
+  </p:timing>
 </p:sld>
 </file>
 
@@ -19498,6 +19948,13 @@
   <p:clrMapOvr>
     <a:masterClrMapping/>
   </p:clrMapOvr>
+  <p:timing>
+    <p:tnLst>
+      <p:par>
+        <p:cTn id="1" dur="indefinite" restart="never" nodeType="tmRoot"/>
+      </p:par>
+    </p:tnLst>
+  </p:timing>
 </p:sld>
 </file>
 
@@ -19660,6 +20117,13 @@
     <a:masterClrMapping/>
   </p:clrMapOvr>
   <p:transition/>
+  <p:timing>
+    <p:tnLst>
+      <p:par>
+        <p:cTn id="1" dur="indefinite" restart="never" nodeType="tmRoot"/>
+      </p:par>
+    </p:tnLst>
+  </p:timing>
 </p:sld>
 </file>
 
@@ -19692,7 +20156,7 @@
         </p:nvSpPr>
         <p:spPr>
           <a:xfrm>
-            <a:off x="0" y="13648"/>
+            <a:off x="0" y="-3769"/>
             <a:ext cx="9144000" cy="533400"/>
           </a:xfrm>
         </p:spPr>
@@ -19708,18 +20172,18 @@
                 <a:solidFill>
                   <a:srgbClr val="FF0000"/>
                 </a:solidFill>
-                <a:latin typeface="Times New Roman" pitchFamily="18" charset="0"/>
-                <a:cs typeface="Times New Roman" pitchFamily="18" charset="0"/>
-              </a:rPr>
-              <a:t>Kết</a:t>
+                <a:latin typeface="Times New Roman" panose="02020603050405020304" pitchFamily="18" charset="0"/>
+                <a:cs typeface="Times New Roman" panose="02020603050405020304" pitchFamily="18" charset="0"/>
+              </a:rPr>
+              <a:t>Hiệp</a:t>
             </a:r>
             <a:r>
               <a:rPr lang="en-US" sz="1800" dirty="0">
                 <a:solidFill>
                   <a:srgbClr val="FF0000"/>
                 </a:solidFill>
-                <a:latin typeface="Times New Roman" pitchFamily="18" charset="0"/>
-                <a:cs typeface="Times New Roman" pitchFamily="18" charset="0"/>
+                <a:latin typeface="Times New Roman" panose="02020603050405020304" pitchFamily="18" charset="0"/>
+                <a:cs typeface="Times New Roman" panose="02020603050405020304" pitchFamily="18" charset="0"/>
               </a:rPr>
               <a:t> </a:t>
             </a:r>
@@ -19728,8 +20192,8 @@
                 <a:solidFill>
                   <a:srgbClr val="FF0000"/>
                 </a:solidFill>
-                <a:latin typeface="Times New Roman" pitchFamily="18" charset="0"/>
-                <a:cs typeface="Times New Roman" pitchFamily="18" charset="0"/>
+                <a:latin typeface="Times New Roman" panose="02020603050405020304" pitchFamily="18" charset="0"/>
+                <a:cs typeface="Times New Roman" panose="02020603050405020304" pitchFamily="18" charset="0"/>
               </a:rPr>
               <a:t>Lễ</a:t>
             </a:r>
@@ -19738,23 +20202,13 @@
                 <a:solidFill>
                   <a:srgbClr val="FF0000"/>
                 </a:solidFill>
-                <a:latin typeface="Times New Roman" pitchFamily="18" charset="0"/>
-                <a:cs typeface="Times New Roman" pitchFamily="18" charset="0"/>
-              </a:rPr>
-              <a:t>                      </a:t>
-            </a:r>
-            <a:r>
-              <a:rPr lang="vi-VN" sz="1800" dirty="0">
-                <a:solidFill>
-                  <a:srgbClr val="FF0000"/>
-                </a:solidFill>
-                <a:latin typeface="Times New Roman" pitchFamily="18" charset="0"/>
-                <a:cs typeface="Times New Roman" pitchFamily="18" charset="0"/>
-              </a:rPr>
-              <a:t>	    </a:t>
-            </a:r>
-            <a:r>
-              <a:rPr lang="vi-VN" sz="2400" b="1" dirty="0">
+                <a:latin typeface="Times New Roman" panose="02020603050405020304" pitchFamily="18" charset="0"/>
+                <a:cs typeface="Times New Roman" panose="02020603050405020304" pitchFamily="18" charset="0"/>
+              </a:rPr>
+              <a:t>                             </a:t>
+            </a:r>
+            <a:r>
+              <a:rPr lang="en-US" sz="2400" b="1" dirty="0">
                 <a:solidFill>
                   <a:srgbClr val="FF0000"/>
                 </a:solidFill>
@@ -19765,10 +20219,10 @@
                     </a:srgbClr>
                   </a:outerShdw>
                 </a:effectLst>
-                <a:latin typeface="Times New Roman" pitchFamily="18" charset="0"/>
-                <a:cs typeface="Times New Roman" pitchFamily="18" charset="0"/>
-              </a:rPr>
-              <a:t>DÂNG VỀ MẸ (KL)</a:t>
+                <a:latin typeface="Times New Roman" panose="02020603050405020304" pitchFamily="18" charset="0"/>
+                <a:cs typeface="Times New Roman" panose="02020603050405020304" pitchFamily="18" charset="0"/>
+              </a:rPr>
+              <a:t>TIẾNG KÊU TRONG SA MẠC (KN)</a:t>
             </a:r>
             <a:endParaRPr lang="en-US" sz="2400" b="1" dirty="0">
               <a:solidFill>
@@ -19797,8 +20251,8 @@
         </p:nvSpPr>
         <p:spPr>
           <a:xfrm>
-            <a:off x="0" y="1265885"/>
-            <a:ext cx="9144000" cy="5810514"/>
+            <a:off x="0" y="1375825"/>
+            <a:ext cx="9144000" cy="4219339"/>
           </a:xfrm>
         </p:spPr>
         <p:txBody>
@@ -19812,15 +20266,19 @@
               <a:rPr lang="vi-VN" sz="5400" b="1" dirty="0">
                 <a:latin typeface="+mj-lt"/>
               </a:rPr>
-              <a:t>ĐK. Con dâng về Mẹ một niềm tin yêu bao la, Một lòng cậy trông vàng đá. Dâng lên Mẹ lời kinh như áng hương trầm. Diệu huyền tỏa bay nơi nơi.</a:t>
-            </a:r>
+              <a:t>1. Có một người được Cha sai đến làm nhân chứng cho nguồn ánh sáng để tung gieo muôn lời chân lý hầu nơi nơi tuân phục thiên ý. </a:t>
+            </a:r>
+            <a:endParaRPr lang="vi-VN" sz="5400" b="1" dirty="0">
+              <a:latin typeface="+mj-lt"/>
+              <a:cs typeface="Times New Roman" panose="02020603050405020304" pitchFamily="18" charset="0"/>
+            </a:endParaRPr>
           </a:p>
         </p:txBody>
       </p:sp>
     </p:spTree>
     <p:extLst>
       <p:ext uri="{BB962C8B-B14F-4D97-AF65-F5344CB8AC3E}">
-        <p14:creationId xmlns:p14="http://schemas.microsoft.com/office/powerpoint/2010/main" val="536193845"/>
+        <p14:creationId xmlns:p14="http://schemas.microsoft.com/office/powerpoint/2010/main" val="1980254831"/>
       </p:ext>
     </p:extLst>
   </p:cSld>
@@ -19828,6 +20286,13 @@
     <a:masterClrMapping/>
   </p:clrMapOvr>
   <p:transition/>
+  <p:timing>
+    <p:tnLst>
+      <p:par>
+        <p:cTn id="1" dur="indefinite" restart="never" nodeType="tmRoot"/>
+      </p:par>
+    </p:tnLst>
+  </p:timing>
 </p:sld>
 </file>
 
@@ -19860,7 +20325,7 @@
         </p:nvSpPr>
         <p:spPr>
           <a:xfrm>
-            <a:off x="0" y="13648"/>
+            <a:off x="0" y="-3769"/>
             <a:ext cx="9144000" cy="533400"/>
           </a:xfrm>
         </p:spPr>
@@ -19876,18 +20341,18 @@
                 <a:solidFill>
                   <a:srgbClr val="FF0000"/>
                 </a:solidFill>
-                <a:latin typeface="Times New Roman" pitchFamily="18" charset="0"/>
-                <a:cs typeface="Times New Roman" pitchFamily="18" charset="0"/>
-              </a:rPr>
-              <a:t>Kết</a:t>
+                <a:latin typeface="Times New Roman" panose="02020603050405020304" pitchFamily="18" charset="0"/>
+                <a:cs typeface="Times New Roman" panose="02020603050405020304" pitchFamily="18" charset="0"/>
+              </a:rPr>
+              <a:t>Hiệp</a:t>
             </a:r>
             <a:r>
               <a:rPr lang="en-US" sz="1800" dirty="0">
                 <a:solidFill>
                   <a:srgbClr val="FF0000"/>
                 </a:solidFill>
-                <a:latin typeface="Times New Roman" pitchFamily="18" charset="0"/>
-                <a:cs typeface="Times New Roman" pitchFamily="18" charset="0"/>
+                <a:latin typeface="Times New Roman" panose="02020603050405020304" pitchFamily="18" charset="0"/>
+                <a:cs typeface="Times New Roman" panose="02020603050405020304" pitchFamily="18" charset="0"/>
               </a:rPr>
               <a:t> </a:t>
             </a:r>
@@ -19896,8 +20361,8 @@
                 <a:solidFill>
                   <a:srgbClr val="FF0000"/>
                 </a:solidFill>
-                <a:latin typeface="Times New Roman" pitchFamily="18" charset="0"/>
-                <a:cs typeface="Times New Roman" pitchFamily="18" charset="0"/>
+                <a:latin typeface="Times New Roman" panose="02020603050405020304" pitchFamily="18" charset="0"/>
+                <a:cs typeface="Times New Roman" panose="02020603050405020304" pitchFamily="18" charset="0"/>
               </a:rPr>
               <a:t>Lễ</a:t>
             </a:r>
@@ -19906,23 +20371,13 @@
                 <a:solidFill>
                   <a:srgbClr val="FF0000"/>
                 </a:solidFill>
-                <a:latin typeface="Times New Roman" pitchFamily="18" charset="0"/>
-                <a:cs typeface="Times New Roman" pitchFamily="18" charset="0"/>
-              </a:rPr>
-              <a:t>                      </a:t>
-            </a:r>
-            <a:r>
-              <a:rPr lang="vi-VN" sz="1800" dirty="0">
-                <a:solidFill>
-                  <a:srgbClr val="FF0000"/>
-                </a:solidFill>
-                <a:latin typeface="Times New Roman" pitchFamily="18" charset="0"/>
-                <a:cs typeface="Times New Roman" pitchFamily="18" charset="0"/>
-              </a:rPr>
-              <a:t>	    </a:t>
-            </a:r>
-            <a:r>
-              <a:rPr lang="vi-VN" sz="2400" b="1" dirty="0">
+                <a:latin typeface="Times New Roman" panose="02020603050405020304" pitchFamily="18" charset="0"/>
+                <a:cs typeface="Times New Roman" panose="02020603050405020304" pitchFamily="18" charset="0"/>
+              </a:rPr>
+              <a:t>                             </a:t>
+            </a:r>
+            <a:r>
+              <a:rPr lang="en-US" sz="2400" b="1" dirty="0">
                 <a:solidFill>
                   <a:srgbClr val="FF0000"/>
                 </a:solidFill>
@@ -19933,10 +20388,10 @@
                     </a:srgbClr>
                   </a:outerShdw>
                 </a:effectLst>
-                <a:latin typeface="Times New Roman" pitchFamily="18" charset="0"/>
-                <a:cs typeface="Times New Roman" pitchFamily="18" charset="0"/>
-              </a:rPr>
-              <a:t>DÂNG VỀ MẸ (KL)</a:t>
+                <a:latin typeface="Times New Roman" panose="02020603050405020304" pitchFamily="18" charset="0"/>
+                <a:cs typeface="Times New Roman" panose="02020603050405020304" pitchFamily="18" charset="0"/>
+              </a:rPr>
+              <a:t>TIẾNG KÊU TRONG SA MẠC (KN)</a:t>
             </a:r>
             <a:endParaRPr lang="en-US" sz="2400" b="1" dirty="0">
               <a:solidFill>
@@ -19965,8 +20420,8 @@
         </p:nvSpPr>
         <p:spPr>
           <a:xfrm>
-            <a:off x="0" y="1530000"/>
-            <a:ext cx="9144000" cy="5282285"/>
+            <a:off x="0" y="1375825"/>
+            <a:ext cx="9144000" cy="4219339"/>
           </a:xfrm>
         </p:spPr>
         <p:txBody>
@@ -19980,15 +20435,19 @@
               <a:rPr lang="vi-VN" sz="5400" b="1" dirty="0">
                 <a:latin typeface="+mj-lt"/>
               </a:rPr>
-              <a:t>1. Con dâng về Mẹ: Trọn cuộc đời nơi khóc than, Đường đời nguy nan Mẹ nâng đỡ cho vẹn toàn.</a:t>
-            </a:r>
+              <a:t>Chính tên Người là Thánh Gio-an đến chuẩn bị cho Chúa dân riêng, đến khơi nguồn ơn phúc thiêng liêng, ánh dương Ngài soi chiếu muôn niên.</a:t>
+            </a:r>
+            <a:endParaRPr lang="vi-VN" sz="5400" b="1" dirty="0">
+              <a:latin typeface="+mj-lt"/>
+              <a:cs typeface="Times New Roman" panose="02020603050405020304" pitchFamily="18" charset="0"/>
+            </a:endParaRPr>
           </a:p>
         </p:txBody>
       </p:sp>
     </p:spTree>
     <p:extLst>
       <p:ext uri="{BB962C8B-B14F-4D97-AF65-F5344CB8AC3E}">
-        <p14:creationId xmlns:p14="http://schemas.microsoft.com/office/powerpoint/2010/main" val="882410794"/>
+        <p14:creationId xmlns:p14="http://schemas.microsoft.com/office/powerpoint/2010/main" val="1965202863"/>
       </p:ext>
     </p:extLst>
   </p:cSld>
@@ -19996,6 +20455,13 @@
     <a:masterClrMapping/>
   </p:clrMapOvr>
   <p:transition/>
+  <p:timing>
+    <p:tnLst>
+      <p:par>
+        <p:cTn id="1" dur="indefinite" restart="never" nodeType="tmRoot"/>
+      </p:par>
+    </p:tnLst>
+  </p:timing>
 </p:sld>
 </file>
 
@@ -20028,7 +20494,7 @@
         </p:nvSpPr>
         <p:spPr>
           <a:xfrm>
-            <a:off x="0" y="13648"/>
+            <a:off x="0" y="-3769"/>
             <a:ext cx="9144000" cy="533400"/>
           </a:xfrm>
         </p:spPr>
@@ -20044,18 +20510,18 @@
                 <a:solidFill>
                   <a:srgbClr val="FF0000"/>
                 </a:solidFill>
-                <a:latin typeface="Times New Roman" pitchFamily="18" charset="0"/>
-                <a:cs typeface="Times New Roman" pitchFamily="18" charset="0"/>
-              </a:rPr>
-              <a:t>Kết</a:t>
+                <a:latin typeface="Times New Roman" panose="02020603050405020304" pitchFamily="18" charset="0"/>
+                <a:cs typeface="Times New Roman" panose="02020603050405020304" pitchFamily="18" charset="0"/>
+              </a:rPr>
+              <a:t>Hiệp</a:t>
             </a:r>
             <a:r>
               <a:rPr lang="en-US" sz="1800" dirty="0">
                 <a:solidFill>
                   <a:srgbClr val="FF0000"/>
                 </a:solidFill>
-                <a:latin typeface="Times New Roman" pitchFamily="18" charset="0"/>
-                <a:cs typeface="Times New Roman" pitchFamily="18" charset="0"/>
+                <a:latin typeface="Times New Roman" panose="02020603050405020304" pitchFamily="18" charset="0"/>
+                <a:cs typeface="Times New Roman" panose="02020603050405020304" pitchFamily="18" charset="0"/>
               </a:rPr>
               <a:t> </a:t>
             </a:r>
@@ -20064,8 +20530,8 @@
                 <a:solidFill>
                   <a:srgbClr val="FF0000"/>
                 </a:solidFill>
-                <a:latin typeface="Times New Roman" pitchFamily="18" charset="0"/>
-                <a:cs typeface="Times New Roman" pitchFamily="18" charset="0"/>
+                <a:latin typeface="Times New Roman" panose="02020603050405020304" pitchFamily="18" charset="0"/>
+                <a:cs typeface="Times New Roman" panose="02020603050405020304" pitchFamily="18" charset="0"/>
               </a:rPr>
               <a:t>Lễ</a:t>
             </a:r>
@@ -20074,23 +20540,13 @@
                 <a:solidFill>
                   <a:srgbClr val="FF0000"/>
                 </a:solidFill>
-                <a:latin typeface="Times New Roman" pitchFamily="18" charset="0"/>
-                <a:cs typeface="Times New Roman" pitchFamily="18" charset="0"/>
-              </a:rPr>
-              <a:t>                      </a:t>
-            </a:r>
-            <a:r>
-              <a:rPr lang="vi-VN" sz="1800" dirty="0">
-                <a:solidFill>
-                  <a:srgbClr val="FF0000"/>
-                </a:solidFill>
-                <a:latin typeface="Times New Roman" pitchFamily="18" charset="0"/>
-                <a:cs typeface="Times New Roman" pitchFamily="18" charset="0"/>
-              </a:rPr>
-              <a:t>	    </a:t>
-            </a:r>
-            <a:r>
-              <a:rPr lang="vi-VN" sz="2400" b="1" dirty="0">
+                <a:latin typeface="Times New Roman" panose="02020603050405020304" pitchFamily="18" charset="0"/>
+                <a:cs typeface="Times New Roman" panose="02020603050405020304" pitchFamily="18" charset="0"/>
+              </a:rPr>
+              <a:t>                             </a:t>
+            </a:r>
+            <a:r>
+              <a:rPr lang="en-US" sz="2400" b="1" dirty="0">
                 <a:solidFill>
                   <a:srgbClr val="FF0000"/>
                 </a:solidFill>
@@ -20101,10 +20557,10 @@
                     </a:srgbClr>
                   </a:outerShdw>
                 </a:effectLst>
-                <a:latin typeface="Times New Roman" pitchFamily="18" charset="0"/>
-                <a:cs typeface="Times New Roman" pitchFamily="18" charset="0"/>
-              </a:rPr>
-              <a:t>DÂNG VỀ MẸ (KL)</a:t>
+                <a:latin typeface="Times New Roman" panose="02020603050405020304" pitchFamily="18" charset="0"/>
+                <a:cs typeface="Times New Roman" panose="02020603050405020304" pitchFamily="18" charset="0"/>
+              </a:rPr>
+              <a:t>TIẾNG KÊU TRONG SA MẠC (KN)</a:t>
             </a:r>
             <a:endParaRPr lang="en-US" sz="2400" b="1" dirty="0">
               <a:solidFill>
@@ -20133,8 +20589,8 @@
         </p:nvSpPr>
         <p:spPr>
           <a:xfrm>
-            <a:off x="0" y="1265885"/>
-            <a:ext cx="9144000" cy="5810514"/>
+            <a:off x="0" y="1375825"/>
+            <a:ext cx="9144000" cy="4219339"/>
           </a:xfrm>
         </p:spPr>
         <p:txBody>
@@ -20148,15 +20604,19 @@
               <a:rPr lang="vi-VN" sz="5400" b="1" dirty="0">
                 <a:latin typeface="+mj-lt"/>
               </a:rPr>
-              <a:t>ĐK. Con dâng về Mẹ một niềm tin yêu bao la, Một lòng cậy trông vàng đá. Dâng lên Mẹ lời kinh như áng hương trầm. Diệu huyền tỏa bay nơi nơi.</a:t>
-            </a:r>
+              <a:t>ĐK. Có tiếng kêu trong sa mạc buồn, tiếng kêu đưa ta về nguồn, tiếng kêu dẫn ai lầm đường bước lê trông mong tìm hướng. </a:t>
+            </a:r>
+            <a:endParaRPr lang="vi-VN" sz="5400" b="1" dirty="0">
+              <a:latin typeface="+mj-lt"/>
+              <a:cs typeface="Times New Roman" panose="02020603050405020304" pitchFamily="18" charset="0"/>
+            </a:endParaRPr>
           </a:p>
         </p:txBody>
       </p:sp>
     </p:spTree>
     <p:extLst>
       <p:ext uri="{BB962C8B-B14F-4D97-AF65-F5344CB8AC3E}">
-        <p14:creationId xmlns:p14="http://schemas.microsoft.com/office/powerpoint/2010/main" val="3112850632"/>
+        <p14:creationId xmlns:p14="http://schemas.microsoft.com/office/powerpoint/2010/main" val="1302605337"/>
       </p:ext>
     </p:extLst>
   </p:cSld>
@@ -20186,64 +20646,146 @@
       </p:grpSpPr>
       <p:sp>
         <p:nvSpPr>
-          <p:cNvPr id="2" name="Title 1">
-            <a:extLst>
-              <a:ext uri="{FF2B5EF4-FFF2-40B4-BE49-F238E27FC236}">
-                <a16:creationId xmlns:a16="http://schemas.microsoft.com/office/drawing/2014/main" id="{CF08130F-DA6D-4D19-B10C-D85018F22187}"/>
-              </a:ext>
-            </a:extLst>
-          </p:cNvPr>
+          <p:cNvPr id="2" name="Title 1"/>
           <p:cNvSpPr>
             <a:spLocks noGrp="1"/>
           </p:cNvSpPr>
           <p:nvPr>
-            <p:ph type="title"/>
+            <p:ph type="ctrTitle"/>
           </p:nvPr>
         </p:nvSpPr>
-        <p:spPr/>
+        <p:spPr>
+          <a:xfrm>
+            <a:off x="0" y="-3769"/>
+            <a:ext cx="9144000" cy="533400"/>
+          </a:xfrm>
+        </p:spPr>
         <p:txBody>
-          <a:bodyPr/>
+          <a:bodyPr>
+            <a:normAutofit/>
+          </a:bodyPr>
           <a:lstStyle/>
           <a:p>
-            <a:endParaRPr lang="vi-VN"/>
+            <a:pPr algn="l"/>
+            <a:r>
+              <a:rPr lang="en-US" sz="1800" dirty="0" err="1">
+                <a:solidFill>
+                  <a:srgbClr val="FF0000"/>
+                </a:solidFill>
+                <a:latin typeface="Times New Roman" panose="02020603050405020304" pitchFamily="18" charset="0"/>
+                <a:cs typeface="Times New Roman" panose="02020603050405020304" pitchFamily="18" charset="0"/>
+              </a:rPr>
+              <a:t>Hiệp</a:t>
+            </a:r>
+            <a:r>
+              <a:rPr lang="en-US" sz="1800" dirty="0">
+                <a:solidFill>
+                  <a:srgbClr val="FF0000"/>
+                </a:solidFill>
+                <a:latin typeface="Times New Roman" panose="02020603050405020304" pitchFamily="18" charset="0"/>
+                <a:cs typeface="Times New Roman" panose="02020603050405020304" pitchFamily="18" charset="0"/>
+              </a:rPr>
+              <a:t> </a:t>
+            </a:r>
+            <a:r>
+              <a:rPr lang="en-US" sz="1800" dirty="0" err="1">
+                <a:solidFill>
+                  <a:srgbClr val="FF0000"/>
+                </a:solidFill>
+                <a:latin typeface="Times New Roman" panose="02020603050405020304" pitchFamily="18" charset="0"/>
+                <a:cs typeface="Times New Roman" panose="02020603050405020304" pitchFamily="18" charset="0"/>
+              </a:rPr>
+              <a:t>Lễ</a:t>
+            </a:r>
+            <a:r>
+              <a:rPr lang="en-US" sz="1800" dirty="0">
+                <a:solidFill>
+                  <a:srgbClr val="FF0000"/>
+                </a:solidFill>
+                <a:latin typeface="Times New Roman" panose="02020603050405020304" pitchFamily="18" charset="0"/>
+                <a:cs typeface="Times New Roman" panose="02020603050405020304" pitchFamily="18" charset="0"/>
+              </a:rPr>
+              <a:t>                             </a:t>
+            </a:r>
+            <a:r>
+              <a:rPr lang="en-US" sz="2400" b="1" dirty="0">
+                <a:solidFill>
+                  <a:srgbClr val="FF0000"/>
+                </a:solidFill>
+                <a:effectLst>
+                  <a:outerShdw blurRad="38100" dist="38100" dir="2700000" algn="tl">
+                    <a:srgbClr val="000000">
+                      <a:alpha val="43137"/>
+                    </a:srgbClr>
+                  </a:outerShdw>
+                </a:effectLst>
+                <a:latin typeface="Times New Roman" panose="02020603050405020304" pitchFamily="18" charset="0"/>
+                <a:cs typeface="Times New Roman" panose="02020603050405020304" pitchFamily="18" charset="0"/>
+              </a:rPr>
+              <a:t>TIẾNG KÊU TRONG SA MẠC (KN)</a:t>
+            </a:r>
+            <a:endParaRPr lang="en-US" sz="2400" b="1" dirty="0">
+              <a:solidFill>
+                <a:srgbClr val="FF0000"/>
+              </a:solidFill>
+              <a:effectLst>
+                <a:outerShdw blurRad="38100" dist="38100" dir="2700000" algn="tl">
+                  <a:srgbClr val="000000">
+                    <a:alpha val="43137"/>
+                  </a:srgbClr>
+                </a:outerShdw>
+              </a:effectLst>
+            </a:endParaRPr>
           </a:p>
         </p:txBody>
       </p:sp>
       <p:sp>
         <p:nvSpPr>
-          <p:cNvPr id="3" name="Content Placeholder 2">
-            <a:extLst>
-              <a:ext uri="{FF2B5EF4-FFF2-40B4-BE49-F238E27FC236}">
-                <a16:creationId xmlns:a16="http://schemas.microsoft.com/office/drawing/2014/main" id="{5B67FD08-5E99-410D-AAB1-55A312F1BB99}"/>
-              </a:ext>
-            </a:extLst>
-          </p:cNvPr>
+          <p:cNvPr id="3" name="Subtitle 2"/>
           <p:cNvSpPr>
             <a:spLocks noGrp="1"/>
           </p:cNvSpPr>
           <p:nvPr>
-            <p:ph idx="1"/>
+            <p:ph type="subTitle" idx="1"/>
           </p:nvPr>
         </p:nvSpPr>
-        <p:spPr/>
+        <p:spPr>
+          <a:xfrm>
+            <a:off x="0" y="1375825"/>
+            <a:ext cx="9144000" cy="4219339"/>
+          </a:xfrm>
+        </p:spPr>
         <p:txBody>
-          <a:bodyPr/>
+          <a:bodyPr>
+            <a:noAutofit/>
+          </a:bodyPr>
           <a:lstStyle/>
           <a:p>
-            <a:endParaRPr lang="vi-VN"/>
+            <a:pPr algn="just"/>
+            <a:r>
+              <a:rPr lang="vi-VN" sz="5400" b="1" dirty="0">
+                <a:latin typeface="+mj-lt"/>
+              </a:rPr>
+              <a:t>Hãy thống hối ăn năn chừa lỗi, hãy sống cuộc đời đổi mới. Ánh sáng Chúa đưa dìu lối thánh ân tuôn tràn khắp nơi.</a:t>
+            </a:r>
+            <a:endParaRPr lang="vi-VN" sz="5400" b="1" dirty="0">
+              <a:latin typeface="+mj-lt"/>
+              <a:cs typeface="Times New Roman" panose="02020603050405020304" pitchFamily="18" charset="0"/>
+            </a:endParaRPr>
           </a:p>
         </p:txBody>
       </p:sp>
     </p:spTree>
     <p:extLst>
       <p:ext uri="{BB962C8B-B14F-4D97-AF65-F5344CB8AC3E}">
-        <p14:creationId xmlns:p14="http://schemas.microsoft.com/office/powerpoint/2010/main" val="2825679399"/>
+        <p14:creationId xmlns:p14="http://schemas.microsoft.com/office/powerpoint/2010/main" val="1225533733"/>
       </p:ext>
     </p:extLst>
   </p:cSld>
   <p:clrMapOvr>
     <a:masterClrMapping/>
   </p:clrMapOvr>
+  <p:transition/>
 </p:sld>
 </file>
 
@@ -20276,7 +20818,7 @@
         </p:nvSpPr>
         <p:spPr>
           <a:xfrm>
-            <a:off x="0" y="-19009"/>
+            <a:off x="0" y="-3769"/>
             <a:ext cx="9144000" cy="533400"/>
           </a:xfrm>
         </p:spPr>
@@ -20286,6 +20828,47 @@
           </a:bodyPr>
           <a:lstStyle/>
           <a:p>
+            <a:pPr algn="l"/>
+            <a:r>
+              <a:rPr lang="en-US" sz="1800" dirty="0" err="1">
+                <a:solidFill>
+                  <a:srgbClr val="FF0000"/>
+                </a:solidFill>
+                <a:latin typeface="Times New Roman" panose="02020603050405020304" pitchFamily="18" charset="0"/>
+                <a:cs typeface="Times New Roman" panose="02020603050405020304" pitchFamily="18" charset="0"/>
+              </a:rPr>
+              <a:t>Hiệp</a:t>
+            </a:r>
+            <a:r>
+              <a:rPr lang="en-US" sz="1800" dirty="0">
+                <a:solidFill>
+                  <a:srgbClr val="FF0000"/>
+                </a:solidFill>
+                <a:latin typeface="Times New Roman" panose="02020603050405020304" pitchFamily="18" charset="0"/>
+                <a:cs typeface="Times New Roman" panose="02020603050405020304" pitchFamily="18" charset="0"/>
+              </a:rPr>
+              <a:t> </a:t>
+            </a:r>
+            <a:r>
+              <a:rPr lang="en-US" sz="1800" dirty="0" err="1">
+                <a:solidFill>
+                  <a:srgbClr val="FF0000"/>
+                </a:solidFill>
+                <a:latin typeface="Times New Roman" panose="02020603050405020304" pitchFamily="18" charset="0"/>
+                <a:cs typeface="Times New Roman" panose="02020603050405020304" pitchFamily="18" charset="0"/>
+              </a:rPr>
+              <a:t>Lễ</a:t>
+            </a:r>
+            <a:r>
+              <a:rPr lang="en-US" sz="1800" dirty="0">
+                <a:solidFill>
+                  <a:srgbClr val="FF0000"/>
+                </a:solidFill>
+                <a:latin typeface="Times New Roman" panose="02020603050405020304" pitchFamily="18" charset="0"/>
+                <a:cs typeface="Times New Roman" panose="02020603050405020304" pitchFamily="18" charset="0"/>
+              </a:rPr>
+              <a:t>                             </a:t>
+            </a:r>
             <a:r>
               <a:rPr lang="en-US" sz="2400" b="1" dirty="0">
                 <a:solidFill>
@@ -20301,7 +20884,7 @@
                 <a:latin typeface="Times New Roman" panose="02020603050405020304" pitchFamily="18" charset="0"/>
                 <a:cs typeface="Times New Roman" panose="02020603050405020304" pitchFamily="18" charset="0"/>
               </a:rPr>
-              <a:t>KINH CẦU CHO ĐẠI DỊCH</a:t>
+              <a:t>TIẾNG KÊU TRONG SA MẠC (KN)</a:t>
             </a:r>
             <a:endParaRPr lang="en-US" sz="2400" b="1" dirty="0">
               <a:solidFill>
@@ -20330,8 +20913,8 @@
         </p:nvSpPr>
         <p:spPr>
           <a:xfrm>
-            <a:off x="0" y="574548"/>
-            <a:ext cx="9144000" cy="6177534"/>
+            <a:off x="0" y="1375825"/>
+            <a:ext cx="9144000" cy="4219339"/>
           </a:xfrm>
         </p:spPr>
         <p:txBody>
@@ -20343,18 +20926,21 @@
             <a:pPr algn="just"/>
             <a:r>
               <a:rPr lang="vi-VN" sz="5400" b="1" dirty="0">
-                <a:latin typeface="Times New Roman" panose="02020603050405020304" pitchFamily="18" charset="0"/>
-                <a:cs typeface="Times New Roman" panose="02020603050405020304" pitchFamily="18" charset="0"/>
-              </a:rPr>
-              <a:t>Lạy Thiên Chúa Ba Ngôi toàn năng, chúng con đang họp nhau cầu nguyện, tha thiết nài xin cho cơn dịch bệnh mau chấm dứt. Lạy Chúa Cha giàu lòng thương xót, xin nhìn đến nỗi thống khổ của đoàn con trên khắp thế giới, </a:t>
-            </a:r>
+                <a:latin typeface="+mj-lt"/>
+              </a:rPr>
+              <a:t>2. Hãy dọn đường sửa cho ngay ngắn mọi vực sâu lấp đầy chắc chắn, đồi nương cao san lại bằng phẳng nẻo quanh co uốn lại thẳng thắn. </a:t>
+            </a:r>
+            <a:endParaRPr lang="vi-VN" sz="5400" b="1" dirty="0">
+              <a:latin typeface="+mj-lt"/>
+              <a:cs typeface="Times New Roman" panose="02020603050405020304" pitchFamily="18" charset="0"/>
+            </a:endParaRPr>
           </a:p>
         </p:txBody>
       </p:sp>
     </p:spTree>
     <p:extLst>
       <p:ext uri="{BB962C8B-B14F-4D97-AF65-F5344CB8AC3E}">
-        <p14:creationId xmlns:p14="http://schemas.microsoft.com/office/powerpoint/2010/main" val="668872012"/>
+        <p14:creationId xmlns:p14="http://schemas.microsoft.com/office/powerpoint/2010/main" val="2580621596"/>
       </p:ext>
     </p:extLst>
   </p:cSld>
@@ -20394,7 +20980,7 @@
         </p:nvSpPr>
         <p:spPr>
           <a:xfrm>
-            <a:off x="0" y="-19009"/>
+            <a:off x="0" y="-3769"/>
             <a:ext cx="9144000" cy="533400"/>
           </a:xfrm>
         </p:spPr>
@@ -20404,6 +20990,47 @@
           </a:bodyPr>
           <a:lstStyle/>
           <a:p>
+            <a:pPr algn="l"/>
+            <a:r>
+              <a:rPr lang="en-US" sz="1800" dirty="0" err="1">
+                <a:solidFill>
+                  <a:srgbClr val="FF0000"/>
+                </a:solidFill>
+                <a:latin typeface="Times New Roman" panose="02020603050405020304" pitchFamily="18" charset="0"/>
+                <a:cs typeface="Times New Roman" panose="02020603050405020304" pitchFamily="18" charset="0"/>
+              </a:rPr>
+              <a:t>Hiệp</a:t>
+            </a:r>
+            <a:r>
+              <a:rPr lang="en-US" sz="1800" dirty="0">
+                <a:solidFill>
+                  <a:srgbClr val="FF0000"/>
+                </a:solidFill>
+                <a:latin typeface="Times New Roman" panose="02020603050405020304" pitchFamily="18" charset="0"/>
+                <a:cs typeface="Times New Roman" panose="02020603050405020304" pitchFamily="18" charset="0"/>
+              </a:rPr>
+              <a:t> </a:t>
+            </a:r>
+            <a:r>
+              <a:rPr lang="en-US" sz="1800" dirty="0" err="1">
+                <a:solidFill>
+                  <a:srgbClr val="FF0000"/>
+                </a:solidFill>
+                <a:latin typeface="Times New Roman" panose="02020603050405020304" pitchFamily="18" charset="0"/>
+                <a:cs typeface="Times New Roman" panose="02020603050405020304" pitchFamily="18" charset="0"/>
+              </a:rPr>
+              <a:t>Lễ</a:t>
+            </a:r>
+            <a:r>
+              <a:rPr lang="en-US" sz="1800" dirty="0">
+                <a:solidFill>
+                  <a:srgbClr val="FF0000"/>
+                </a:solidFill>
+                <a:latin typeface="Times New Roman" panose="02020603050405020304" pitchFamily="18" charset="0"/>
+                <a:cs typeface="Times New Roman" panose="02020603050405020304" pitchFamily="18" charset="0"/>
+              </a:rPr>
+              <a:t>                             </a:t>
+            </a:r>
             <a:r>
               <a:rPr lang="en-US" sz="2400" b="1" dirty="0">
                 <a:solidFill>
@@ -20419,7 +21046,7 @@
                 <a:latin typeface="Times New Roman" panose="02020603050405020304" pitchFamily="18" charset="0"/>
                 <a:cs typeface="Times New Roman" panose="02020603050405020304" pitchFamily="18" charset="0"/>
               </a:rPr>
-              <a:t>KINH CẦU CHO ĐẠI DỊCH</a:t>
+              <a:t>TIẾNG KÊU TRONG SA MẠC (KN)</a:t>
             </a:r>
             <a:endParaRPr lang="en-US" sz="2400" b="1" dirty="0">
               <a:solidFill>
@@ -20448,8 +21075,8 @@
         </p:nvSpPr>
         <p:spPr>
           <a:xfrm>
-            <a:off x="0" y="574548"/>
-            <a:ext cx="9144000" cy="6177534"/>
+            <a:off x="0" y="1375825"/>
+            <a:ext cx="9144000" cy="4219339"/>
           </a:xfrm>
         </p:spPr>
         <p:txBody>
@@ -20461,18 +21088,21 @@
             <a:pPr algn="just"/>
             <a:r>
               <a:rPr lang="vi-VN" sz="5400" b="1" dirty="0">
-                <a:latin typeface="Times New Roman" panose="02020603050405020304" pitchFamily="18" charset="0"/>
-                <a:cs typeface="Times New Roman" panose="02020603050405020304" pitchFamily="18" charset="0"/>
-              </a:rPr>
-              <a:t>đặc biệt tại những nơi dịch bệnh đang hoành hành. Xin củng cố đức tin của chúng con, cho chúng con hoàn toàn tín thác vào tình yêu quan phòng của Cha. Lạy Chúa Giêsu là Đấng cứu độ duy nhất, </a:t>
-            </a:r>
+                <a:latin typeface="+mj-lt"/>
+              </a:rPr>
+              <a:t>Hãy quay về cải hóa canh tân bởi Nước Trời đã đến ngay bên, Chúa xuất hiện vinh hiển cao sang, ơn cứu độ ban xuống muôn dân.</a:t>
+            </a:r>
+            <a:endParaRPr lang="vi-VN" sz="5400" b="1" dirty="0">
+              <a:latin typeface="+mj-lt"/>
+              <a:cs typeface="Times New Roman" panose="02020603050405020304" pitchFamily="18" charset="0"/>
+            </a:endParaRPr>
           </a:p>
         </p:txBody>
       </p:sp>
     </p:spTree>
     <p:extLst>
       <p:ext uri="{BB962C8B-B14F-4D97-AF65-F5344CB8AC3E}">
-        <p14:creationId xmlns:p14="http://schemas.microsoft.com/office/powerpoint/2010/main" val="3254010152"/>
+        <p14:creationId xmlns:p14="http://schemas.microsoft.com/office/powerpoint/2010/main" val="3367859231"/>
       </p:ext>
     </p:extLst>
   </p:cSld>
@@ -20512,7 +21142,7 @@
         </p:nvSpPr>
         <p:spPr>
           <a:xfrm>
-            <a:off x="0" y="-19009"/>
+            <a:off x="0" y="-3769"/>
             <a:ext cx="9144000" cy="533400"/>
           </a:xfrm>
         </p:spPr>
@@ -20522,6 +21152,47 @@
           </a:bodyPr>
           <a:lstStyle/>
           <a:p>
+            <a:pPr algn="l"/>
+            <a:r>
+              <a:rPr lang="en-US" sz="1800" dirty="0" err="1">
+                <a:solidFill>
+                  <a:srgbClr val="FF0000"/>
+                </a:solidFill>
+                <a:latin typeface="Times New Roman" panose="02020603050405020304" pitchFamily="18" charset="0"/>
+                <a:cs typeface="Times New Roman" panose="02020603050405020304" pitchFamily="18" charset="0"/>
+              </a:rPr>
+              <a:t>Hiệp</a:t>
+            </a:r>
+            <a:r>
+              <a:rPr lang="en-US" sz="1800" dirty="0">
+                <a:solidFill>
+                  <a:srgbClr val="FF0000"/>
+                </a:solidFill>
+                <a:latin typeface="Times New Roman" panose="02020603050405020304" pitchFamily="18" charset="0"/>
+                <a:cs typeface="Times New Roman" panose="02020603050405020304" pitchFamily="18" charset="0"/>
+              </a:rPr>
+              <a:t> </a:t>
+            </a:r>
+            <a:r>
+              <a:rPr lang="en-US" sz="1800" dirty="0" err="1">
+                <a:solidFill>
+                  <a:srgbClr val="FF0000"/>
+                </a:solidFill>
+                <a:latin typeface="Times New Roman" panose="02020603050405020304" pitchFamily="18" charset="0"/>
+                <a:cs typeface="Times New Roman" panose="02020603050405020304" pitchFamily="18" charset="0"/>
+              </a:rPr>
+              <a:t>Lễ</a:t>
+            </a:r>
+            <a:r>
+              <a:rPr lang="en-US" sz="1800" dirty="0">
+                <a:solidFill>
+                  <a:srgbClr val="FF0000"/>
+                </a:solidFill>
+                <a:latin typeface="Times New Roman" panose="02020603050405020304" pitchFamily="18" charset="0"/>
+                <a:cs typeface="Times New Roman" panose="02020603050405020304" pitchFamily="18" charset="0"/>
+              </a:rPr>
+              <a:t>                             </a:t>
+            </a:r>
             <a:r>
               <a:rPr lang="en-US" sz="2400" b="1" dirty="0">
                 <a:solidFill>
@@ -20537,7 +21208,7 @@
                 <a:latin typeface="Times New Roman" panose="02020603050405020304" pitchFamily="18" charset="0"/>
                 <a:cs typeface="Times New Roman" panose="02020603050405020304" pitchFamily="18" charset="0"/>
               </a:rPr>
-              <a:t>KINH CẦU CHO ĐẠI DỊCH</a:t>
+              <a:t>TIẾNG KÊU TRONG SA MẠC (KN)</a:t>
             </a:r>
             <a:endParaRPr lang="en-US" sz="2400" b="1" dirty="0">
               <a:solidFill>
@@ -20566,8 +21237,8 @@
         </p:nvSpPr>
         <p:spPr>
           <a:xfrm>
-            <a:off x="0" y="574548"/>
-            <a:ext cx="9144000" cy="6177534"/>
+            <a:off x="0" y="1375825"/>
+            <a:ext cx="9144000" cy="4219339"/>
           </a:xfrm>
         </p:spPr>
         <p:txBody>
@@ -20579,18 +21250,21 @@
             <a:pPr algn="just"/>
             <a:r>
               <a:rPr lang="vi-VN" sz="5400" b="1" dirty="0">
-                <a:latin typeface="Times New Roman" panose="02020603050405020304" pitchFamily="18" charset="0"/>
-                <a:cs typeface="Times New Roman" panose="02020603050405020304" pitchFamily="18" charset="0"/>
-              </a:rPr>
-              <a:t>là vị lương y đầy quyền năng và lòng thương xót, xin thương cho các bệnh nhân sớm được chữa lành, và an ủi các gia đình đang gặp khó khăn thử thách. Xin cho lời chúng con khiêm tốn cầu nguyện, </a:t>
-            </a:r>
+                <a:latin typeface="+mj-lt"/>
+              </a:rPr>
+              <a:t>ĐK. Có tiếng kêu trong sa mạc buồn, tiếng kêu đưa ta về nguồn, tiếng kêu dẫn ai lầm đường bước lê trông mong tìm hướng. </a:t>
+            </a:r>
+            <a:endParaRPr lang="vi-VN" sz="5400" b="1" dirty="0">
+              <a:latin typeface="+mj-lt"/>
+              <a:cs typeface="Times New Roman" panose="02020603050405020304" pitchFamily="18" charset="0"/>
+            </a:endParaRPr>
           </a:p>
         </p:txBody>
       </p:sp>
     </p:spTree>
     <p:extLst>
       <p:ext uri="{BB962C8B-B14F-4D97-AF65-F5344CB8AC3E}">
-        <p14:creationId xmlns:p14="http://schemas.microsoft.com/office/powerpoint/2010/main" val="3272420548"/>
+        <p14:creationId xmlns:p14="http://schemas.microsoft.com/office/powerpoint/2010/main" val="1604729168"/>
       </p:ext>
     </p:extLst>
   </p:cSld>
@@ -20598,6 +21272,13 @@
     <a:masterClrMapping/>
   </p:clrMapOvr>
   <p:transition/>
+  <p:timing>
+    <p:tnLst>
+      <p:par>
+        <p:cTn id="1" dur="indefinite" restart="never" nodeType="tmRoot"/>
+      </p:par>
+    </p:tnLst>
+  </p:timing>
 </p:sld>
 </file>
 
@@ -20630,7 +21311,7 @@
         </p:nvSpPr>
         <p:spPr>
           <a:xfrm>
-            <a:off x="0" y="-19009"/>
+            <a:off x="0" y="-3769"/>
             <a:ext cx="9144000" cy="533400"/>
           </a:xfrm>
         </p:spPr>
@@ -20640,6 +21321,47 @@
           </a:bodyPr>
           <a:lstStyle/>
           <a:p>
+            <a:pPr algn="l"/>
+            <a:r>
+              <a:rPr lang="en-US" sz="1800" dirty="0" err="1">
+                <a:solidFill>
+                  <a:srgbClr val="FF0000"/>
+                </a:solidFill>
+                <a:latin typeface="Times New Roman" panose="02020603050405020304" pitchFamily="18" charset="0"/>
+                <a:cs typeface="Times New Roman" panose="02020603050405020304" pitchFamily="18" charset="0"/>
+              </a:rPr>
+              <a:t>Hiệp</a:t>
+            </a:r>
+            <a:r>
+              <a:rPr lang="en-US" sz="1800" dirty="0">
+                <a:solidFill>
+                  <a:srgbClr val="FF0000"/>
+                </a:solidFill>
+                <a:latin typeface="Times New Roman" panose="02020603050405020304" pitchFamily="18" charset="0"/>
+                <a:cs typeface="Times New Roman" panose="02020603050405020304" pitchFamily="18" charset="0"/>
+              </a:rPr>
+              <a:t> </a:t>
+            </a:r>
+            <a:r>
+              <a:rPr lang="en-US" sz="1800" dirty="0" err="1">
+                <a:solidFill>
+                  <a:srgbClr val="FF0000"/>
+                </a:solidFill>
+                <a:latin typeface="Times New Roman" panose="02020603050405020304" pitchFamily="18" charset="0"/>
+                <a:cs typeface="Times New Roman" panose="02020603050405020304" pitchFamily="18" charset="0"/>
+              </a:rPr>
+              <a:t>Lễ</a:t>
+            </a:r>
+            <a:r>
+              <a:rPr lang="en-US" sz="1800" dirty="0">
+                <a:solidFill>
+                  <a:srgbClr val="FF0000"/>
+                </a:solidFill>
+                <a:latin typeface="Times New Roman" panose="02020603050405020304" pitchFamily="18" charset="0"/>
+                <a:cs typeface="Times New Roman" panose="02020603050405020304" pitchFamily="18" charset="0"/>
+              </a:rPr>
+              <a:t>                             </a:t>
+            </a:r>
             <a:r>
               <a:rPr lang="en-US" sz="2400" b="1" dirty="0">
                 <a:solidFill>
@@ -20655,7 +21377,7 @@
                 <a:latin typeface="Times New Roman" panose="02020603050405020304" pitchFamily="18" charset="0"/>
                 <a:cs typeface="Times New Roman" panose="02020603050405020304" pitchFamily="18" charset="0"/>
               </a:rPr>
-              <a:t>KINH CẦU CHO ĐẠI DỊCH</a:t>
+              <a:t>TIẾNG KÊU TRONG SA MẠC (KN)</a:t>
             </a:r>
             <a:endParaRPr lang="en-US" sz="2400" b="1" dirty="0">
               <a:solidFill>
@@ -20684,8 +21406,8 @@
         </p:nvSpPr>
         <p:spPr>
           <a:xfrm>
-            <a:off x="0" y="574548"/>
-            <a:ext cx="9144000" cy="6177534"/>
+            <a:off x="0" y="1375825"/>
+            <a:ext cx="9144000" cy="4219339"/>
           </a:xfrm>
         </p:spPr>
         <p:txBody>
@@ -20697,18 +21419,21 @@
             <a:pPr algn="just"/>
             <a:r>
               <a:rPr lang="vi-VN" sz="5400" b="1" dirty="0">
-                <a:latin typeface="Times New Roman" panose="02020603050405020304" pitchFamily="18" charset="0"/>
-                <a:cs typeface="Times New Roman" panose="02020603050405020304" pitchFamily="18" charset="0"/>
-              </a:rPr>
-              <a:t>được chạm tới trái tim nhân lành của Chúa, xin giảm bớt gánh nặng khổ đau, và cho chúng con cảm nhận được bàn tay Chúa đang ân cần nâng đỡ chúng con. Lạy Chúa Thánh Thần là nguồn sức mạnh tình yêu, </a:t>
-            </a:r>
+                <a:latin typeface="+mj-lt"/>
+              </a:rPr>
+              <a:t>Hãy thống hối ăn năn chừa lỗi, hãy sống cuộc đời đổi mới. Ánh sáng Chúa đưa dìu lối thánh ân tuôn tràn khắp nơi.</a:t>
+            </a:r>
+            <a:endParaRPr lang="vi-VN" sz="5400" b="1" dirty="0">
+              <a:latin typeface="+mj-lt"/>
+              <a:cs typeface="Times New Roman" panose="02020603050405020304" pitchFamily="18" charset="0"/>
+            </a:endParaRPr>
           </a:p>
         </p:txBody>
       </p:sp>
     </p:spTree>
     <p:extLst>
       <p:ext uri="{BB962C8B-B14F-4D97-AF65-F5344CB8AC3E}">
-        <p14:creationId xmlns:p14="http://schemas.microsoft.com/office/powerpoint/2010/main" val="1070452570"/>
+        <p14:creationId xmlns:p14="http://schemas.microsoft.com/office/powerpoint/2010/main" val="1676438394"/>
       </p:ext>
     </p:extLst>
   </p:cSld>
@@ -20716,6 +21441,13 @@
     <a:masterClrMapping/>
   </p:clrMapOvr>
   <p:transition/>
+  <p:timing>
+    <p:tnLst>
+      <p:par>
+        <p:cTn id="1" dur="indefinite" restart="never" nodeType="tmRoot"/>
+      </p:par>
+    </p:tnLst>
+  </p:timing>
 </p:sld>
 </file>
 
@@ -20748,7 +21480,7 @@
         </p:nvSpPr>
         <p:spPr>
           <a:xfrm>
-            <a:off x="0" y="-19009"/>
+            <a:off x="0" y="-3769"/>
             <a:ext cx="9144000" cy="533400"/>
           </a:xfrm>
         </p:spPr>
@@ -20758,6 +21490,47 @@
           </a:bodyPr>
           <a:lstStyle/>
           <a:p>
+            <a:pPr algn="l"/>
+            <a:r>
+              <a:rPr lang="en-US" sz="1800" dirty="0" err="1">
+                <a:solidFill>
+                  <a:srgbClr val="FF0000"/>
+                </a:solidFill>
+                <a:latin typeface="Times New Roman" panose="02020603050405020304" pitchFamily="18" charset="0"/>
+                <a:cs typeface="Times New Roman" panose="02020603050405020304" pitchFamily="18" charset="0"/>
+              </a:rPr>
+              <a:t>Hiệp</a:t>
+            </a:r>
+            <a:r>
+              <a:rPr lang="en-US" sz="1800" dirty="0">
+                <a:solidFill>
+                  <a:srgbClr val="FF0000"/>
+                </a:solidFill>
+                <a:latin typeface="Times New Roman" panose="02020603050405020304" pitchFamily="18" charset="0"/>
+                <a:cs typeface="Times New Roman" panose="02020603050405020304" pitchFamily="18" charset="0"/>
+              </a:rPr>
+              <a:t> </a:t>
+            </a:r>
+            <a:r>
+              <a:rPr lang="en-US" sz="1800" dirty="0" err="1">
+                <a:solidFill>
+                  <a:srgbClr val="FF0000"/>
+                </a:solidFill>
+                <a:latin typeface="Times New Roman" panose="02020603050405020304" pitchFamily="18" charset="0"/>
+                <a:cs typeface="Times New Roman" panose="02020603050405020304" pitchFamily="18" charset="0"/>
+              </a:rPr>
+              <a:t>Lễ</a:t>
+            </a:r>
+            <a:r>
+              <a:rPr lang="en-US" sz="1800" dirty="0">
+                <a:solidFill>
+                  <a:srgbClr val="FF0000"/>
+                </a:solidFill>
+                <a:latin typeface="Times New Roman" panose="02020603050405020304" pitchFamily="18" charset="0"/>
+                <a:cs typeface="Times New Roman" panose="02020603050405020304" pitchFamily="18" charset="0"/>
+              </a:rPr>
+              <a:t>                             </a:t>
+            </a:r>
             <a:r>
               <a:rPr lang="en-US" sz="2400" b="1" dirty="0">
                 <a:solidFill>
@@ -20773,7 +21546,7 @@
                 <a:latin typeface="Times New Roman" panose="02020603050405020304" pitchFamily="18" charset="0"/>
                 <a:cs typeface="Times New Roman" panose="02020603050405020304" pitchFamily="18" charset="0"/>
               </a:rPr>
-              <a:t>KINH CẦU CHO ĐẠI DỊCH</a:t>
+              <a:t>TIẾNG KÊU TRONG SA MẠC (KN)</a:t>
             </a:r>
             <a:endParaRPr lang="en-US" sz="2400" b="1" dirty="0">
               <a:solidFill>
@@ -20802,8 +21575,8 @@
         </p:nvSpPr>
         <p:spPr>
           <a:xfrm>
-            <a:off x="0" y="574548"/>
-            <a:ext cx="9144000" cy="6177534"/>
+            <a:off x="0" y="1375825"/>
+            <a:ext cx="9144000" cy="4219339"/>
           </a:xfrm>
         </p:spPr>
         <p:txBody>
@@ -20815,18 +21588,21 @@
             <a:pPr algn="just"/>
             <a:r>
               <a:rPr lang="vi-VN" sz="5400" b="1" dirty="0">
-                <a:latin typeface="Times New Roman" panose="02020603050405020304" pitchFamily="18" charset="0"/>
-                <a:cs typeface="Times New Roman" panose="02020603050405020304" pitchFamily="18" charset="0"/>
-              </a:rPr>
-              <a:t>xin soi sáng các vị hữu trách và những người có khả năng, giúp họ sớm tìm ra phương thuốc chữa trị dịch bệnh, xin ban cho các bác sĩ và nhân viên y tế, sức mạnh của tình thương và lòng nhiệt thành quảng đại, </a:t>
-            </a:r>
+                <a:latin typeface="+mj-lt"/>
+              </a:rPr>
+              <a:t>3. Có một vị quyền năng khôn xiết mà ta đây ai nào hay biết, rửa ta trong Thánh Thần chân lý quyền uy linh của Ngài cao quý. </a:t>
+            </a:r>
+            <a:endParaRPr lang="vi-VN" sz="5400" b="1" dirty="0">
+              <a:latin typeface="+mj-lt"/>
+              <a:cs typeface="Times New Roman" panose="02020603050405020304" pitchFamily="18" charset="0"/>
+            </a:endParaRPr>
           </a:p>
         </p:txBody>
       </p:sp>
     </p:spTree>
     <p:extLst>
       <p:ext uri="{BB962C8B-B14F-4D97-AF65-F5344CB8AC3E}">
-        <p14:creationId xmlns:p14="http://schemas.microsoft.com/office/powerpoint/2010/main" val="354398195"/>
+        <p14:creationId xmlns:p14="http://schemas.microsoft.com/office/powerpoint/2010/main" val="1465076021"/>
       </p:ext>
     </p:extLst>
   </p:cSld>
@@ -20834,6 +21610,13 @@
     <a:masterClrMapping/>
   </p:clrMapOvr>
   <p:transition/>
+  <p:timing>
+    <p:tnLst>
+      <p:par>
+        <p:cTn id="1" dur="indefinite" restart="never" nodeType="tmRoot"/>
+      </p:par>
+    </p:tnLst>
+  </p:timing>
 </p:sld>
 </file>
 
@@ -20913,6 +21696,13 @@
   <p:clrMapOvr>
     <a:masterClrMapping/>
   </p:clrMapOvr>
+  <p:timing>
+    <p:tnLst>
+      <p:par>
+        <p:cTn id="1" dur="indefinite" restart="never" nodeType="tmRoot"/>
+      </p:par>
+    </p:tnLst>
+  </p:timing>
 </p:sld>
 </file>
 
@@ -20945,7 +21735,7 @@
         </p:nvSpPr>
         <p:spPr>
           <a:xfrm>
-            <a:off x="0" y="-19009"/>
+            <a:off x="0" y="-3769"/>
             <a:ext cx="9144000" cy="533400"/>
           </a:xfrm>
         </p:spPr>
@@ -20955,6 +21745,47 @@
           </a:bodyPr>
           <a:lstStyle/>
           <a:p>
+            <a:pPr algn="l"/>
+            <a:r>
+              <a:rPr lang="en-US" sz="1800" dirty="0" err="1">
+                <a:solidFill>
+                  <a:srgbClr val="FF0000"/>
+                </a:solidFill>
+                <a:latin typeface="Times New Roman" panose="02020603050405020304" pitchFamily="18" charset="0"/>
+                <a:cs typeface="Times New Roman" panose="02020603050405020304" pitchFamily="18" charset="0"/>
+              </a:rPr>
+              <a:t>Hiệp</a:t>
+            </a:r>
+            <a:r>
+              <a:rPr lang="en-US" sz="1800" dirty="0">
+                <a:solidFill>
+                  <a:srgbClr val="FF0000"/>
+                </a:solidFill>
+                <a:latin typeface="Times New Roman" panose="02020603050405020304" pitchFamily="18" charset="0"/>
+                <a:cs typeface="Times New Roman" panose="02020603050405020304" pitchFamily="18" charset="0"/>
+              </a:rPr>
+              <a:t> </a:t>
+            </a:r>
+            <a:r>
+              <a:rPr lang="en-US" sz="1800" dirty="0" err="1">
+                <a:solidFill>
+                  <a:srgbClr val="FF0000"/>
+                </a:solidFill>
+                <a:latin typeface="Times New Roman" panose="02020603050405020304" pitchFamily="18" charset="0"/>
+                <a:cs typeface="Times New Roman" panose="02020603050405020304" pitchFamily="18" charset="0"/>
+              </a:rPr>
+              <a:t>Lễ</a:t>
+            </a:r>
+            <a:r>
+              <a:rPr lang="en-US" sz="1800" dirty="0">
+                <a:solidFill>
+                  <a:srgbClr val="FF0000"/>
+                </a:solidFill>
+                <a:latin typeface="Times New Roman" panose="02020603050405020304" pitchFamily="18" charset="0"/>
+                <a:cs typeface="Times New Roman" panose="02020603050405020304" pitchFamily="18" charset="0"/>
+              </a:rPr>
+              <a:t>                             </a:t>
+            </a:r>
             <a:r>
               <a:rPr lang="en-US" sz="2400" b="1" dirty="0">
                 <a:solidFill>
@@ -20970,7 +21801,7 @@
                 <a:latin typeface="Times New Roman" panose="02020603050405020304" pitchFamily="18" charset="0"/>
                 <a:cs typeface="Times New Roman" panose="02020603050405020304" pitchFamily="18" charset="0"/>
               </a:rPr>
-              <a:t>KINH CẦU CHO ĐẠI DỊCH</a:t>
+              <a:t>TIẾNG KÊU TRONG SA MẠC (KN)</a:t>
             </a:r>
             <a:endParaRPr lang="en-US" sz="2400" b="1" dirty="0">
               <a:solidFill>
@@ -20999,8 +21830,8 @@
         </p:nvSpPr>
         <p:spPr>
           <a:xfrm>
-            <a:off x="0" y="574548"/>
-            <a:ext cx="9144000" cy="6177534"/>
+            <a:off x="0" y="1375825"/>
+            <a:ext cx="9144000" cy="4219339"/>
           </a:xfrm>
         </p:spPr>
         <p:txBody>
@@ -21012,20 +21843,12 @@
             <a:pPr algn="just"/>
             <a:r>
               <a:rPr lang="vi-VN" sz="5400" b="1" dirty="0">
-                <a:latin typeface="Times New Roman" panose="02020603050405020304" pitchFamily="18" charset="0"/>
-                <a:cs typeface="Times New Roman" panose="02020603050405020304" pitchFamily="18" charset="0"/>
-              </a:rPr>
-              <a:t>luôn tận tâm tận lực phục vụ các bệnh nhân. Chúng con xin trao vào đôi tay từ mẫu của Mẹ Maria, những lời khẩn nguyện trong cơn đại nạn, nhờ lời Đức Mẹ chuyển cầu, xin Chúa nhận lời chúng con. Amen</a:t>
-            </a:r>
-            <a:r>
-              <a:rPr lang="en-US" sz="5400" b="1" dirty="0">
-                <a:latin typeface="Times New Roman" panose="02020603050405020304" pitchFamily="18" charset="0"/>
-                <a:cs typeface="Times New Roman" panose="02020603050405020304" pitchFamily="18" charset="0"/>
-              </a:rPr>
-              <a:t>.</a:t>
+                <a:latin typeface="+mj-lt"/>
+              </a:rPr>
+              <a:t>Chốn hoang địa cằn cỗi reo ca cõi cô tịch bỗng nở muôn hoa, Chúa Cứu Độ sẽ đến bên ta, chẳng ai còn rên xiết kêu la.</a:t>
             </a:r>
             <a:endParaRPr lang="vi-VN" sz="5400" b="1" dirty="0">
-              <a:latin typeface="Times New Roman" panose="02020603050405020304" pitchFamily="18" charset="0"/>
+              <a:latin typeface="+mj-lt"/>
               <a:cs typeface="Times New Roman" panose="02020603050405020304" pitchFamily="18" charset="0"/>
             </a:endParaRPr>
           </a:p>
@@ -21034,7 +21857,7 @@
     </p:spTree>
     <p:extLst>
       <p:ext uri="{BB962C8B-B14F-4D97-AF65-F5344CB8AC3E}">
-        <p14:creationId xmlns:p14="http://schemas.microsoft.com/office/powerpoint/2010/main" val="371941318"/>
+        <p14:creationId xmlns:p14="http://schemas.microsoft.com/office/powerpoint/2010/main" val="1485692655"/>
       </p:ext>
     </p:extLst>
   </p:cSld>
@@ -21042,6 +21865,1557 @@
     <a:masterClrMapping/>
   </p:clrMapOvr>
   <p:transition/>
+  <p:timing>
+    <p:tnLst>
+      <p:par>
+        <p:cTn id="1" dur="indefinite" restart="never" nodeType="tmRoot"/>
+      </p:par>
+    </p:tnLst>
+  </p:timing>
+</p:sld>
+</file>
+
+<file path=ppt/slides/slide81.xml><?xml version="1.0" encoding="utf-8"?>
+<p:sld xmlns:a="http://schemas.openxmlformats.org/drawingml/2006/main" xmlns:r="http://schemas.openxmlformats.org/officeDocument/2006/relationships" xmlns:p="http://schemas.openxmlformats.org/presentationml/2006/main">
+  <p:cSld>
+    <p:spTree>
+      <p:nvGrpSpPr>
+        <p:cNvPr id="1" name=""/>
+        <p:cNvGrpSpPr/>
+        <p:nvPr/>
+      </p:nvGrpSpPr>
+      <p:grpSpPr>
+        <a:xfrm>
+          <a:off x="0" y="0"/>
+          <a:ext cx="0" cy="0"/>
+          <a:chOff x="0" y="0"/>
+          <a:chExt cx="0" cy="0"/>
+        </a:xfrm>
+      </p:grpSpPr>
+      <p:sp>
+        <p:nvSpPr>
+          <p:cNvPr id="2" name="Title 1"/>
+          <p:cNvSpPr>
+            <a:spLocks noGrp="1"/>
+          </p:cNvSpPr>
+          <p:nvPr>
+            <p:ph type="ctrTitle"/>
+          </p:nvPr>
+        </p:nvSpPr>
+        <p:spPr>
+          <a:xfrm>
+            <a:off x="0" y="-3769"/>
+            <a:ext cx="9144000" cy="533400"/>
+          </a:xfrm>
+        </p:spPr>
+        <p:txBody>
+          <a:bodyPr>
+            <a:normAutofit/>
+          </a:bodyPr>
+          <a:lstStyle/>
+          <a:p>
+            <a:pPr algn="l"/>
+            <a:r>
+              <a:rPr lang="en-US" sz="1800" dirty="0" err="1">
+                <a:solidFill>
+                  <a:srgbClr val="FF0000"/>
+                </a:solidFill>
+                <a:latin typeface="Times New Roman" panose="02020603050405020304" pitchFamily="18" charset="0"/>
+                <a:cs typeface="Times New Roman" panose="02020603050405020304" pitchFamily="18" charset="0"/>
+              </a:rPr>
+              <a:t>Hiệp</a:t>
+            </a:r>
+            <a:r>
+              <a:rPr lang="en-US" sz="1800" dirty="0">
+                <a:solidFill>
+                  <a:srgbClr val="FF0000"/>
+                </a:solidFill>
+                <a:latin typeface="Times New Roman" panose="02020603050405020304" pitchFamily="18" charset="0"/>
+                <a:cs typeface="Times New Roman" panose="02020603050405020304" pitchFamily="18" charset="0"/>
+              </a:rPr>
+              <a:t> </a:t>
+            </a:r>
+            <a:r>
+              <a:rPr lang="en-US" sz="1800" dirty="0" err="1">
+                <a:solidFill>
+                  <a:srgbClr val="FF0000"/>
+                </a:solidFill>
+                <a:latin typeface="Times New Roman" panose="02020603050405020304" pitchFamily="18" charset="0"/>
+                <a:cs typeface="Times New Roman" panose="02020603050405020304" pitchFamily="18" charset="0"/>
+              </a:rPr>
+              <a:t>Lễ</a:t>
+            </a:r>
+            <a:r>
+              <a:rPr lang="en-US" sz="1800" dirty="0">
+                <a:solidFill>
+                  <a:srgbClr val="FF0000"/>
+                </a:solidFill>
+                <a:latin typeface="Times New Roman" panose="02020603050405020304" pitchFamily="18" charset="0"/>
+                <a:cs typeface="Times New Roman" panose="02020603050405020304" pitchFamily="18" charset="0"/>
+              </a:rPr>
+              <a:t>                             </a:t>
+            </a:r>
+            <a:r>
+              <a:rPr lang="en-US" sz="2400" b="1" dirty="0">
+                <a:solidFill>
+                  <a:srgbClr val="FF0000"/>
+                </a:solidFill>
+                <a:effectLst>
+                  <a:outerShdw blurRad="38100" dist="38100" dir="2700000" algn="tl">
+                    <a:srgbClr val="000000">
+                      <a:alpha val="43137"/>
+                    </a:srgbClr>
+                  </a:outerShdw>
+                </a:effectLst>
+                <a:latin typeface="Times New Roman" panose="02020603050405020304" pitchFamily="18" charset="0"/>
+                <a:cs typeface="Times New Roman" panose="02020603050405020304" pitchFamily="18" charset="0"/>
+              </a:rPr>
+              <a:t>TIẾNG KÊU TRONG SA MẠC (KN)</a:t>
+            </a:r>
+            <a:endParaRPr lang="en-US" sz="2400" b="1" dirty="0">
+              <a:solidFill>
+                <a:srgbClr val="FF0000"/>
+              </a:solidFill>
+              <a:effectLst>
+                <a:outerShdw blurRad="38100" dist="38100" dir="2700000" algn="tl">
+                  <a:srgbClr val="000000">
+                    <a:alpha val="43137"/>
+                  </a:srgbClr>
+                </a:outerShdw>
+              </a:effectLst>
+            </a:endParaRPr>
+          </a:p>
+        </p:txBody>
+      </p:sp>
+      <p:sp>
+        <p:nvSpPr>
+          <p:cNvPr id="3" name="Subtitle 2"/>
+          <p:cNvSpPr>
+            <a:spLocks noGrp="1"/>
+          </p:cNvSpPr>
+          <p:nvPr>
+            <p:ph type="subTitle" idx="1"/>
+          </p:nvPr>
+        </p:nvSpPr>
+        <p:spPr>
+          <a:xfrm>
+            <a:off x="0" y="1375825"/>
+            <a:ext cx="9144000" cy="4219339"/>
+          </a:xfrm>
+        </p:spPr>
+        <p:txBody>
+          <a:bodyPr>
+            <a:noAutofit/>
+          </a:bodyPr>
+          <a:lstStyle/>
+          <a:p>
+            <a:pPr algn="just"/>
+            <a:r>
+              <a:rPr lang="vi-VN" sz="5400" b="1" dirty="0">
+                <a:latin typeface="+mj-lt"/>
+              </a:rPr>
+              <a:t>ĐK. Có tiếng kêu trong sa mạc buồn, tiếng kêu đưa ta về nguồn, tiếng kêu dẫn ai lầm đường bước lê trông mong tìm hướng. </a:t>
+            </a:r>
+            <a:endParaRPr lang="vi-VN" sz="5400" b="1" dirty="0">
+              <a:latin typeface="+mj-lt"/>
+              <a:cs typeface="Times New Roman" panose="02020603050405020304" pitchFamily="18" charset="0"/>
+            </a:endParaRPr>
+          </a:p>
+        </p:txBody>
+      </p:sp>
+    </p:spTree>
+    <p:extLst>
+      <p:ext uri="{BB962C8B-B14F-4D97-AF65-F5344CB8AC3E}">
+        <p14:creationId xmlns:p14="http://schemas.microsoft.com/office/powerpoint/2010/main" val="85047675"/>
+      </p:ext>
+    </p:extLst>
+  </p:cSld>
+  <p:clrMapOvr>
+    <a:masterClrMapping/>
+  </p:clrMapOvr>
+  <p:transition/>
+  <p:timing>
+    <p:tnLst>
+      <p:par>
+        <p:cTn id="1" dur="indefinite" restart="never" nodeType="tmRoot"/>
+      </p:par>
+    </p:tnLst>
+  </p:timing>
+</p:sld>
+</file>
+
+<file path=ppt/slides/slide82.xml><?xml version="1.0" encoding="utf-8"?>
+<p:sld xmlns:a="http://schemas.openxmlformats.org/drawingml/2006/main" xmlns:r="http://schemas.openxmlformats.org/officeDocument/2006/relationships" xmlns:p="http://schemas.openxmlformats.org/presentationml/2006/main">
+  <p:cSld>
+    <p:spTree>
+      <p:nvGrpSpPr>
+        <p:cNvPr id="1" name=""/>
+        <p:cNvGrpSpPr/>
+        <p:nvPr/>
+      </p:nvGrpSpPr>
+      <p:grpSpPr>
+        <a:xfrm>
+          <a:off x="0" y="0"/>
+          <a:ext cx="0" cy="0"/>
+          <a:chOff x="0" y="0"/>
+          <a:chExt cx="0" cy="0"/>
+        </a:xfrm>
+      </p:grpSpPr>
+      <p:sp>
+        <p:nvSpPr>
+          <p:cNvPr id="2" name="Title 1"/>
+          <p:cNvSpPr>
+            <a:spLocks noGrp="1"/>
+          </p:cNvSpPr>
+          <p:nvPr>
+            <p:ph type="ctrTitle"/>
+          </p:nvPr>
+        </p:nvSpPr>
+        <p:spPr>
+          <a:xfrm>
+            <a:off x="0" y="-3769"/>
+            <a:ext cx="9144000" cy="533400"/>
+          </a:xfrm>
+        </p:spPr>
+        <p:txBody>
+          <a:bodyPr>
+            <a:normAutofit/>
+          </a:bodyPr>
+          <a:lstStyle/>
+          <a:p>
+            <a:pPr algn="l"/>
+            <a:r>
+              <a:rPr lang="en-US" sz="1800" dirty="0" err="1">
+                <a:solidFill>
+                  <a:srgbClr val="FF0000"/>
+                </a:solidFill>
+                <a:latin typeface="Times New Roman" panose="02020603050405020304" pitchFamily="18" charset="0"/>
+                <a:cs typeface="Times New Roman" panose="02020603050405020304" pitchFamily="18" charset="0"/>
+              </a:rPr>
+              <a:t>Hiệp</a:t>
+            </a:r>
+            <a:r>
+              <a:rPr lang="en-US" sz="1800" dirty="0">
+                <a:solidFill>
+                  <a:srgbClr val="FF0000"/>
+                </a:solidFill>
+                <a:latin typeface="Times New Roman" panose="02020603050405020304" pitchFamily="18" charset="0"/>
+                <a:cs typeface="Times New Roman" panose="02020603050405020304" pitchFamily="18" charset="0"/>
+              </a:rPr>
+              <a:t> </a:t>
+            </a:r>
+            <a:r>
+              <a:rPr lang="en-US" sz="1800" dirty="0" err="1">
+                <a:solidFill>
+                  <a:srgbClr val="FF0000"/>
+                </a:solidFill>
+                <a:latin typeface="Times New Roman" panose="02020603050405020304" pitchFamily="18" charset="0"/>
+                <a:cs typeface="Times New Roman" panose="02020603050405020304" pitchFamily="18" charset="0"/>
+              </a:rPr>
+              <a:t>Lễ</a:t>
+            </a:r>
+            <a:r>
+              <a:rPr lang="en-US" sz="1800" dirty="0">
+                <a:solidFill>
+                  <a:srgbClr val="FF0000"/>
+                </a:solidFill>
+                <a:latin typeface="Times New Roman" panose="02020603050405020304" pitchFamily="18" charset="0"/>
+                <a:cs typeface="Times New Roman" panose="02020603050405020304" pitchFamily="18" charset="0"/>
+              </a:rPr>
+              <a:t>                             </a:t>
+            </a:r>
+            <a:r>
+              <a:rPr lang="en-US" sz="2400" b="1" dirty="0">
+                <a:solidFill>
+                  <a:srgbClr val="FF0000"/>
+                </a:solidFill>
+                <a:effectLst>
+                  <a:outerShdw blurRad="38100" dist="38100" dir="2700000" algn="tl">
+                    <a:srgbClr val="000000">
+                      <a:alpha val="43137"/>
+                    </a:srgbClr>
+                  </a:outerShdw>
+                </a:effectLst>
+                <a:latin typeface="Times New Roman" panose="02020603050405020304" pitchFamily="18" charset="0"/>
+                <a:cs typeface="Times New Roman" panose="02020603050405020304" pitchFamily="18" charset="0"/>
+              </a:rPr>
+              <a:t>TIẾNG KÊU TRONG SA MẠC (KN)</a:t>
+            </a:r>
+            <a:endParaRPr lang="en-US" sz="2400" b="1" dirty="0">
+              <a:solidFill>
+                <a:srgbClr val="FF0000"/>
+              </a:solidFill>
+              <a:effectLst>
+                <a:outerShdw blurRad="38100" dist="38100" dir="2700000" algn="tl">
+                  <a:srgbClr val="000000">
+                    <a:alpha val="43137"/>
+                  </a:srgbClr>
+                </a:outerShdw>
+              </a:effectLst>
+            </a:endParaRPr>
+          </a:p>
+        </p:txBody>
+      </p:sp>
+      <p:sp>
+        <p:nvSpPr>
+          <p:cNvPr id="3" name="Subtitle 2"/>
+          <p:cNvSpPr>
+            <a:spLocks noGrp="1"/>
+          </p:cNvSpPr>
+          <p:nvPr>
+            <p:ph type="subTitle" idx="1"/>
+          </p:nvPr>
+        </p:nvSpPr>
+        <p:spPr>
+          <a:xfrm>
+            <a:off x="0" y="1375825"/>
+            <a:ext cx="9144000" cy="4219339"/>
+          </a:xfrm>
+        </p:spPr>
+        <p:txBody>
+          <a:bodyPr>
+            <a:noAutofit/>
+          </a:bodyPr>
+          <a:lstStyle/>
+          <a:p>
+            <a:pPr algn="just"/>
+            <a:r>
+              <a:rPr lang="vi-VN" sz="5400" b="1" dirty="0">
+                <a:latin typeface="+mj-lt"/>
+              </a:rPr>
+              <a:t>Hãy thống hối ăn năn chừa lỗi, hãy sống cuộc đời đổi mới. Ánh sáng Chúa đưa dìu lối thánh ân tuôn tràn khắp nơi.</a:t>
+            </a:r>
+            <a:endParaRPr lang="vi-VN" sz="5400" b="1" dirty="0">
+              <a:latin typeface="+mj-lt"/>
+              <a:cs typeface="Times New Roman" panose="02020603050405020304" pitchFamily="18" charset="0"/>
+            </a:endParaRPr>
+          </a:p>
+        </p:txBody>
+      </p:sp>
+    </p:spTree>
+    <p:extLst>
+      <p:ext uri="{BB962C8B-B14F-4D97-AF65-F5344CB8AC3E}">
+        <p14:creationId xmlns:p14="http://schemas.microsoft.com/office/powerpoint/2010/main" val="3696785749"/>
+      </p:ext>
+    </p:extLst>
+  </p:cSld>
+  <p:clrMapOvr>
+    <a:masterClrMapping/>
+  </p:clrMapOvr>
+  <p:transition/>
+  <p:timing>
+    <p:tnLst>
+      <p:par>
+        <p:cTn id="1" dur="indefinite" restart="never" nodeType="tmRoot"/>
+      </p:par>
+    </p:tnLst>
+  </p:timing>
+</p:sld>
+</file>
+
+<file path=ppt/slides/slide83.xml><?xml version="1.0" encoding="utf-8"?>
+<p:sld xmlns:a="http://schemas.openxmlformats.org/drawingml/2006/main" xmlns:r="http://schemas.openxmlformats.org/officeDocument/2006/relationships" xmlns:p="http://schemas.openxmlformats.org/presentationml/2006/main">
+  <p:cSld>
+    <p:spTree>
+      <p:nvGrpSpPr>
+        <p:cNvPr id="1" name=""/>
+        <p:cNvGrpSpPr/>
+        <p:nvPr/>
+      </p:nvGrpSpPr>
+      <p:grpSpPr>
+        <a:xfrm>
+          <a:off x="0" y="0"/>
+          <a:ext cx="0" cy="0"/>
+          <a:chOff x="0" y="0"/>
+          <a:chExt cx="0" cy="0"/>
+        </a:xfrm>
+      </p:grpSpPr>
+      <p:sp>
+        <p:nvSpPr>
+          <p:cNvPr id="2" name="Title 1"/>
+          <p:cNvSpPr>
+            <a:spLocks noGrp="1"/>
+          </p:cNvSpPr>
+          <p:nvPr>
+            <p:ph type="ctrTitle"/>
+          </p:nvPr>
+        </p:nvSpPr>
+        <p:spPr>
+          <a:xfrm>
+            <a:off x="0" y="-3769"/>
+            <a:ext cx="9144000" cy="533400"/>
+          </a:xfrm>
+        </p:spPr>
+        <p:txBody>
+          <a:bodyPr>
+            <a:normAutofit/>
+          </a:bodyPr>
+          <a:lstStyle/>
+          <a:p>
+            <a:pPr algn="l"/>
+            <a:r>
+              <a:rPr lang="en-US" sz="1800" dirty="0" err="1">
+                <a:solidFill>
+                  <a:srgbClr val="FF0000"/>
+                </a:solidFill>
+                <a:latin typeface="Times New Roman" panose="02020603050405020304" pitchFamily="18" charset="0"/>
+                <a:cs typeface="Times New Roman" panose="02020603050405020304" pitchFamily="18" charset="0"/>
+              </a:rPr>
+              <a:t>Hiệp</a:t>
+            </a:r>
+            <a:r>
+              <a:rPr lang="en-US" sz="1800" dirty="0">
+                <a:solidFill>
+                  <a:srgbClr val="FF0000"/>
+                </a:solidFill>
+                <a:latin typeface="Times New Roman" panose="02020603050405020304" pitchFamily="18" charset="0"/>
+                <a:cs typeface="Times New Roman" panose="02020603050405020304" pitchFamily="18" charset="0"/>
+              </a:rPr>
+              <a:t> </a:t>
+            </a:r>
+            <a:r>
+              <a:rPr lang="en-US" sz="1800" dirty="0" err="1">
+                <a:solidFill>
+                  <a:srgbClr val="FF0000"/>
+                </a:solidFill>
+                <a:latin typeface="Times New Roman" panose="02020603050405020304" pitchFamily="18" charset="0"/>
+                <a:cs typeface="Times New Roman" panose="02020603050405020304" pitchFamily="18" charset="0"/>
+              </a:rPr>
+              <a:t>Lễ</a:t>
+            </a:r>
+            <a:r>
+              <a:rPr lang="en-US" sz="1800" dirty="0">
+                <a:solidFill>
+                  <a:srgbClr val="FF0000"/>
+                </a:solidFill>
+                <a:latin typeface="Times New Roman" panose="02020603050405020304" pitchFamily="18" charset="0"/>
+                <a:cs typeface="Times New Roman" panose="02020603050405020304" pitchFamily="18" charset="0"/>
+              </a:rPr>
+              <a:t>                             </a:t>
+            </a:r>
+            <a:r>
+              <a:rPr lang="en-US" sz="2400" b="1" dirty="0">
+                <a:solidFill>
+                  <a:srgbClr val="FF0000"/>
+                </a:solidFill>
+                <a:effectLst>
+                  <a:outerShdw blurRad="38100" dist="38100" dir="2700000" algn="tl">
+                    <a:srgbClr val="000000">
+                      <a:alpha val="43137"/>
+                    </a:srgbClr>
+                  </a:outerShdw>
+                </a:effectLst>
+                <a:latin typeface="Times New Roman" panose="02020603050405020304" pitchFamily="18" charset="0"/>
+                <a:cs typeface="Times New Roman" panose="02020603050405020304" pitchFamily="18" charset="0"/>
+              </a:rPr>
+              <a:t>TIẾNG KÊU TRONG SA MẠC (KN)</a:t>
+            </a:r>
+            <a:endParaRPr lang="en-US" sz="2400" b="1" dirty="0">
+              <a:solidFill>
+                <a:srgbClr val="FF0000"/>
+              </a:solidFill>
+              <a:effectLst>
+                <a:outerShdw blurRad="38100" dist="38100" dir="2700000" algn="tl">
+                  <a:srgbClr val="000000">
+                    <a:alpha val="43137"/>
+                  </a:srgbClr>
+                </a:outerShdw>
+              </a:effectLst>
+            </a:endParaRPr>
+          </a:p>
+        </p:txBody>
+      </p:sp>
+      <p:sp>
+        <p:nvSpPr>
+          <p:cNvPr id="3" name="Subtitle 2"/>
+          <p:cNvSpPr>
+            <a:spLocks noGrp="1"/>
+          </p:cNvSpPr>
+          <p:nvPr>
+            <p:ph type="subTitle" idx="1"/>
+          </p:nvPr>
+        </p:nvSpPr>
+        <p:spPr>
+          <a:xfrm>
+            <a:off x="0" y="1375825"/>
+            <a:ext cx="9144000" cy="4219339"/>
+          </a:xfrm>
+        </p:spPr>
+        <p:txBody>
+          <a:bodyPr>
+            <a:noAutofit/>
+          </a:bodyPr>
+          <a:lstStyle/>
+          <a:p>
+            <a:pPr algn="just"/>
+            <a:r>
+              <a:rPr lang="vi-VN" sz="5400" b="1" dirty="0">
+                <a:latin typeface="+mj-lt"/>
+              </a:rPr>
+              <a:t>4. Bước chân theo Ngài con vui sướng: Ngài chọn con lên hàng khanh tướng, để cho đi không còn bận vướng đường con đi chan hòa ánh sáng.</a:t>
+            </a:r>
+            <a:endParaRPr lang="vi-VN" sz="5400" b="1" dirty="0">
+              <a:latin typeface="+mj-lt"/>
+              <a:cs typeface="Times New Roman" panose="02020603050405020304" pitchFamily="18" charset="0"/>
+            </a:endParaRPr>
+          </a:p>
+        </p:txBody>
+      </p:sp>
+    </p:spTree>
+    <p:extLst>
+      <p:ext uri="{BB962C8B-B14F-4D97-AF65-F5344CB8AC3E}">
+        <p14:creationId xmlns:p14="http://schemas.microsoft.com/office/powerpoint/2010/main" val="151565329"/>
+      </p:ext>
+    </p:extLst>
+  </p:cSld>
+  <p:clrMapOvr>
+    <a:masterClrMapping/>
+  </p:clrMapOvr>
+  <p:transition/>
+  <p:timing>
+    <p:tnLst>
+      <p:par>
+        <p:cTn id="1" dur="indefinite" restart="never" nodeType="tmRoot"/>
+      </p:par>
+    </p:tnLst>
+  </p:timing>
+</p:sld>
+</file>
+
+<file path=ppt/slides/slide84.xml><?xml version="1.0" encoding="utf-8"?>
+<p:sld xmlns:a="http://schemas.openxmlformats.org/drawingml/2006/main" xmlns:r="http://schemas.openxmlformats.org/officeDocument/2006/relationships" xmlns:p="http://schemas.openxmlformats.org/presentationml/2006/main">
+  <p:cSld>
+    <p:spTree>
+      <p:nvGrpSpPr>
+        <p:cNvPr id="1" name=""/>
+        <p:cNvGrpSpPr/>
+        <p:nvPr/>
+      </p:nvGrpSpPr>
+      <p:grpSpPr>
+        <a:xfrm>
+          <a:off x="0" y="0"/>
+          <a:ext cx="0" cy="0"/>
+          <a:chOff x="0" y="0"/>
+          <a:chExt cx="0" cy="0"/>
+        </a:xfrm>
+      </p:grpSpPr>
+      <p:sp>
+        <p:nvSpPr>
+          <p:cNvPr id="2" name="Title 1"/>
+          <p:cNvSpPr>
+            <a:spLocks noGrp="1"/>
+          </p:cNvSpPr>
+          <p:nvPr>
+            <p:ph type="ctrTitle"/>
+          </p:nvPr>
+        </p:nvSpPr>
+        <p:spPr>
+          <a:xfrm>
+            <a:off x="0" y="-3769"/>
+            <a:ext cx="9144000" cy="533400"/>
+          </a:xfrm>
+        </p:spPr>
+        <p:txBody>
+          <a:bodyPr>
+            <a:normAutofit/>
+          </a:bodyPr>
+          <a:lstStyle/>
+          <a:p>
+            <a:pPr algn="l"/>
+            <a:r>
+              <a:rPr lang="en-US" sz="1800" dirty="0" err="1">
+                <a:solidFill>
+                  <a:srgbClr val="FF0000"/>
+                </a:solidFill>
+                <a:latin typeface="Times New Roman" panose="02020603050405020304" pitchFamily="18" charset="0"/>
+                <a:cs typeface="Times New Roman" panose="02020603050405020304" pitchFamily="18" charset="0"/>
+              </a:rPr>
+              <a:t>Hiệp</a:t>
+            </a:r>
+            <a:r>
+              <a:rPr lang="en-US" sz="1800" dirty="0">
+                <a:solidFill>
+                  <a:srgbClr val="FF0000"/>
+                </a:solidFill>
+                <a:latin typeface="Times New Roman" panose="02020603050405020304" pitchFamily="18" charset="0"/>
+                <a:cs typeface="Times New Roman" panose="02020603050405020304" pitchFamily="18" charset="0"/>
+              </a:rPr>
+              <a:t> </a:t>
+            </a:r>
+            <a:r>
+              <a:rPr lang="en-US" sz="1800" dirty="0" err="1">
+                <a:solidFill>
+                  <a:srgbClr val="FF0000"/>
+                </a:solidFill>
+                <a:latin typeface="Times New Roman" panose="02020603050405020304" pitchFamily="18" charset="0"/>
+                <a:cs typeface="Times New Roman" panose="02020603050405020304" pitchFamily="18" charset="0"/>
+              </a:rPr>
+              <a:t>Lễ</a:t>
+            </a:r>
+            <a:r>
+              <a:rPr lang="en-US" sz="1800" dirty="0">
+                <a:solidFill>
+                  <a:srgbClr val="FF0000"/>
+                </a:solidFill>
+                <a:latin typeface="Times New Roman" panose="02020603050405020304" pitchFamily="18" charset="0"/>
+                <a:cs typeface="Times New Roman" panose="02020603050405020304" pitchFamily="18" charset="0"/>
+              </a:rPr>
+              <a:t>                             </a:t>
+            </a:r>
+            <a:r>
+              <a:rPr lang="en-US" sz="2400" b="1" dirty="0">
+                <a:solidFill>
+                  <a:srgbClr val="FF0000"/>
+                </a:solidFill>
+                <a:effectLst>
+                  <a:outerShdw blurRad="38100" dist="38100" dir="2700000" algn="tl">
+                    <a:srgbClr val="000000">
+                      <a:alpha val="43137"/>
+                    </a:srgbClr>
+                  </a:outerShdw>
+                </a:effectLst>
+                <a:latin typeface="Times New Roman" panose="02020603050405020304" pitchFamily="18" charset="0"/>
+                <a:cs typeface="Times New Roman" panose="02020603050405020304" pitchFamily="18" charset="0"/>
+              </a:rPr>
+              <a:t>TIẾNG KÊU TRONG SA MẠC (KN)</a:t>
+            </a:r>
+            <a:endParaRPr lang="en-US" sz="2400" b="1" dirty="0">
+              <a:solidFill>
+                <a:srgbClr val="FF0000"/>
+              </a:solidFill>
+              <a:effectLst>
+                <a:outerShdw blurRad="38100" dist="38100" dir="2700000" algn="tl">
+                  <a:srgbClr val="000000">
+                    <a:alpha val="43137"/>
+                  </a:srgbClr>
+                </a:outerShdw>
+              </a:effectLst>
+            </a:endParaRPr>
+          </a:p>
+        </p:txBody>
+      </p:sp>
+      <p:sp>
+        <p:nvSpPr>
+          <p:cNvPr id="3" name="Subtitle 2"/>
+          <p:cNvSpPr>
+            <a:spLocks noGrp="1"/>
+          </p:cNvSpPr>
+          <p:nvPr>
+            <p:ph type="subTitle" idx="1"/>
+          </p:nvPr>
+        </p:nvSpPr>
+        <p:spPr>
+          <a:xfrm>
+            <a:off x="0" y="1375825"/>
+            <a:ext cx="9144000" cy="4219339"/>
+          </a:xfrm>
+        </p:spPr>
+        <p:txBody>
+          <a:bodyPr>
+            <a:noAutofit/>
+          </a:bodyPr>
+          <a:lstStyle/>
+          <a:p>
+            <a:pPr algn="just"/>
+            <a:r>
+              <a:rPr lang="vi-VN" sz="5400" b="1" dirty="0">
+                <a:latin typeface="+mj-lt"/>
+              </a:rPr>
+              <a:t>Hãy dâng lời cất tiếng hoan ca: Chúa trên trời đã viếng thăm ta, dẫn ta vào an thái bao la, đến muôn đời Ngài vẫn thương ta.</a:t>
+            </a:r>
+            <a:endParaRPr lang="vi-VN" sz="5400" b="1" dirty="0">
+              <a:latin typeface="+mj-lt"/>
+              <a:cs typeface="Times New Roman" panose="02020603050405020304" pitchFamily="18" charset="0"/>
+            </a:endParaRPr>
+          </a:p>
+        </p:txBody>
+      </p:sp>
+    </p:spTree>
+    <p:extLst>
+      <p:ext uri="{BB962C8B-B14F-4D97-AF65-F5344CB8AC3E}">
+        <p14:creationId xmlns:p14="http://schemas.microsoft.com/office/powerpoint/2010/main" val="2153649022"/>
+      </p:ext>
+    </p:extLst>
+  </p:cSld>
+  <p:clrMapOvr>
+    <a:masterClrMapping/>
+  </p:clrMapOvr>
+  <p:transition/>
+  <p:timing>
+    <p:tnLst>
+      <p:par>
+        <p:cTn id="1" dur="indefinite" restart="never" nodeType="tmRoot"/>
+      </p:par>
+    </p:tnLst>
+  </p:timing>
+</p:sld>
+</file>
+
+<file path=ppt/slides/slide85.xml><?xml version="1.0" encoding="utf-8"?>
+<p:sld xmlns:a="http://schemas.openxmlformats.org/drawingml/2006/main" xmlns:r="http://schemas.openxmlformats.org/officeDocument/2006/relationships" xmlns:p="http://schemas.openxmlformats.org/presentationml/2006/main">
+  <p:cSld>
+    <p:spTree>
+      <p:nvGrpSpPr>
+        <p:cNvPr id="1" name=""/>
+        <p:cNvGrpSpPr/>
+        <p:nvPr/>
+      </p:nvGrpSpPr>
+      <p:grpSpPr>
+        <a:xfrm>
+          <a:off x="0" y="0"/>
+          <a:ext cx="0" cy="0"/>
+          <a:chOff x="0" y="0"/>
+          <a:chExt cx="0" cy="0"/>
+        </a:xfrm>
+      </p:grpSpPr>
+      <p:sp>
+        <p:nvSpPr>
+          <p:cNvPr id="2" name="Title 1"/>
+          <p:cNvSpPr>
+            <a:spLocks noGrp="1"/>
+          </p:cNvSpPr>
+          <p:nvPr>
+            <p:ph type="ctrTitle"/>
+          </p:nvPr>
+        </p:nvSpPr>
+        <p:spPr>
+          <a:xfrm>
+            <a:off x="0" y="-3769"/>
+            <a:ext cx="9144000" cy="533400"/>
+          </a:xfrm>
+        </p:spPr>
+        <p:txBody>
+          <a:bodyPr>
+            <a:normAutofit/>
+          </a:bodyPr>
+          <a:lstStyle/>
+          <a:p>
+            <a:pPr algn="l"/>
+            <a:r>
+              <a:rPr lang="en-US" sz="1800" dirty="0" err="1">
+                <a:solidFill>
+                  <a:srgbClr val="FF0000"/>
+                </a:solidFill>
+                <a:latin typeface="Times New Roman" panose="02020603050405020304" pitchFamily="18" charset="0"/>
+                <a:cs typeface="Times New Roman" panose="02020603050405020304" pitchFamily="18" charset="0"/>
+              </a:rPr>
+              <a:t>Hiệp</a:t>
+            </a:r>
+            <a:r>
+              <a:rPr lang="en-US" sz="1800" dirty="0">
+                <a:solidFill>
+                  <a:srgbClr val="FF0000"/>
+                </a:solidFill>
+                <a:latin typeface="Times New Roman" panose="02020603050405020304" pitchFamily="18" charset="0"/>
+                <a:cs typeface="Times New Roman" panose="02020603050405020304" pitchFamily="18" charset="0"/>
+              </a:rPr>
+              <a:t> </a:t>
+            </a:r>
+            <a:r>
+              <a:rPr lang="en-US" sz="1800" dirty="0" err="1">
+                <a:solidFill>
+                  <a:srgbClr val="FF0000"/>
+                </a:solidFill>
+                <a:latin typeface="Times New Roman" panose="02020603050405020304" pitchFamily="18" charset="0"/>
+                <a:cs typeface="Times New Roman" panose="02020603050405020304" pitchFamily="18" charset="0"/>
+              </a:rPr>
+              <a:t>Lễ</a:t>
+            </a:r>
+            <a:r>
+              <a:rPr lang="en-US" sz="1800" dirty="0">
+                <a:solidFill>
+                  <a:srgbClr val="FF0000"/>
+                </a:solidFill>
+                <a:latin typeface="Times New Roman" panose="02020603050405020304" pitchFamily="18" charset="0"/>
+                <a:cs typeface="Times New Roman" panose="02020603050405020304" pitchFamily="18" charset="0"/>
+              </a:rPr>
+              <a:t>                             </a:t>
+            </a:r>
+            <a:r>
+              <a:rPr lang="en-US" sz="2400" b="1" dirty="0">
+                <a:solidFill>
+                  <a:srgbClr val="FF0000"/>
+                </a:solidFill>
+                <a:effectLst>
+                  <a:outerShdw blurRad="38100" dist="38100" dir="2700000" algn="tl">
+                    <a:srgbClr val="000000">
+                      <a:alpha val="43137"/>
+                    </a:srgbClr>
+                  </a:outerShdw>
+                </a:effectLst>
+                <a:latin typeface="Times New Roman" panose="02020603050405020304" pitchFamily="18" charset="0"/>
+                <a:cs typeface="Times New Roman" panose="02020603050405020304" pitchFamily="18" charset="0"/>
+              </a:rPr>
+              <a:t>TIẾNG KÊU TRONG SA MẠC (KN)</a:t>
+            </a:r>
+            <a:endParaRPr lang="en-US" sz="2400" b="1" dirty="0">
+              <a:solidFill>
+                <a:srgbClr val="FF0000"/>
+              </a:solidFill>
+              <a:effectLst>
+                <a:outerShdw blurRad="38100" dist="38100" dir="2700000" algn="tl">
+                  <a:srgbClr val="000000">
+                    <a:alpha val="43137"/>
+                  </a:srgbClr>
+                </a:outerShdw>
+              </a:effectLst>
+            </a:endParaRPr>
+          </a:p>
+        </p:txBody>
+      </p:sp>
+      <p:sp>
+        <p:nvSpPr>
+          <p:cNvPr id="3" name="Subtitle 2"/>
+          <p:cNvSpPr>
+            <a:spLocks noGrp="1"/>
+          </p:cNvSpPr>
+          <p:nvPr>
+            <p:ph type="subTitle" idx="1"/>
+          </p:nvPr>
+        </p:nvSpPr>
+        <p:spPr>
+          <a:xfrm>
+            <a:off x="0" y="1375825"/>
+            <a:ext cx="9144000" cy="4219339"/>
+          </a:xfrm>
+        </p:spPr>
+        <p:txBody>
+          <a:bodyPr>
+            <a:noAutofit/>
+          </a:bodyPr>
+          <a:lstStyle/>
+          <a:p>
+            <a:pPr algn="just"/>
+            <a:r>
+              <a:rPr lang="vi-VN" sz="5400" b="1" dirty="0">
+                <a:latin typeface="+mj-lt"/>
+              </a:rPr>
+              <a:t>ĐK. Có tiếng kêu trong sa mạc buồn, tiếng kêu đưa ta về nguồn, tiếng kêu dẫn ai lầm đường bước lê trông mong tìm hướng. </a:t>
+            </a:r>
+            <a:endParaRPr lang="vi-VN" sz="5400" b="1" dirty="0">
+              <a:latin typeface="+mj-lt"/>
+              <a:cs typeface="Times New Roman" panose="02020603050405020304" pitchFamily="18" charset="0"/>
+            </a:endParaRPr>
+          </a:p>
+        </p:txBody>
+      </p:sp>
+    </p:spTree>
+    <p:extLst>
+      <p:ext uri="{BB962C8B-B14F-4D97-AF65-F5344CB8AC3E}">
+        <p14:creationId xmlns:p14="http://schemas.microsoft.com/office/powerpoint/2010/main" val="1450485698"/>
+      </p:ext>
+    </p:extLst>
+  </p:cSld>
+  <p:clrMapOvr>
+    <a:masterClrMapping/>
+  </p:clrMapOvr>
+  <p:transition/>
+  <p:timing>
+    <p:tnLst>
+      <p:par>
+        <p:cTn id="1" dur="indefinite" restart="never" nodeType="tmRoot"/>
+      </p:par>
+    </p:tnLst>
+  </p:timing>
+</p:sld>
+</file>
+
+<file path=ppt/slides/slide86.xml><?xml version="1.0" encoding="utf-8"?>
+<p:sld xmlns:a="http://schemas.openxmlformats.org/drawingml/2006/main" xmlns:r="http://schemas.openxmlformats.org/officeDocument/2006/relationships" xmlns:p="http://schemas.openxmlformats.org/presentationml/2006/main">
+  <p:cSld>
+    <p:spTree>
+      <p:nvGrpSpPr>
+        <p:cNvPr id="1" name=""/>
+        <p:cNvGrpSpPr/>
+        <p:nvPr/>
+      </p:nvGrpSpPr>
+      <p:grpSpPr>
+        <a:xfrm>
+          <a:off x="0" y="0"/>
+          <a:ext cx="0" cy="0"/>
+          <a:chOff x="0" y="0"/>
+          <a:chExt cx="0" cy="0"/>
+        </a:xfrm>
+      </p:grpSpPr>
+      <p:sp>
+        <p:nvSpPr>
+          <p:cNvPr id="2" name="Title 1"/>
+          <p:cNvSpPr>
+            <a:spLocks noGrp="1"/>
+          </p:cNvSpPr>
+          <p:nvPr>
+            <p:ph type="ctrTitle"/>
+          </p:nvPr>
+        </p:nvSpPr>
+        <p:spPr>
+          <a:xfrm>
+            <a:off x="0" y="-3769"/>
+            <a:ext cx="9144000" cy="533400"/>
+          </a:xfrm>
+        </p:spPr>
+        <p:txBody>
+          <a:bodyPr>
+            <a:normAutofit/>
+          </a:bodyPr>
+          <a:lstStyle/>
+          <a:p>
+            <a:pPr algn="l"/>
+            <a:r>
+              <a:rPr lang="en-US" sz="1800" dirty="0" err="1">
+                <a:solidFill>
+                  <a:srgbClr val="FF0000"/>
+                </a:solidFill>
+                <a:latin typeface="Times New Roman" panose="02020603050405020304" pitchFamily="18" charset="0"/>
+                <a:cs typeface="Times New Roman" panose="02020603050405020304" pitchFamily="18" charset="0"/>
+              </a:rPr>
+              <a:t>Hiệp</a:t>
+            </a:r>
+            <a:r>
+              <a:rPr lang="en-US" sz="1800" dirty="0">
+                <a:solidFill>
+                  <a:srgbClr val="FF0000"/>
+                </a:solidFill>
+                <a:latin typeface="Times New Roman" panose="02020603050405020304" pitchFamily="18" charset="0"/>
+                <a:cs typeface="Times New Roman" panose="02020603050405020304" pitchFamily="18" charset="0"/>
+              </a:rPr>
+              <a:t> </a:t>
+            </a:r>
+            <a:r>
+              <a:rPr lang="en-US" sz="1800" dirty="0" err="1">
+                <a:solidFill>
+                  <a:srgbClr val="FF0000"/>
+                </a:solidFill>
+                <a:latin typeface="Times New Roman" panose="02020603050405020304" pitchFamily="18" charset="0"/>
+                <a:cs typeface="Times New Roman" panose="02020603050405020304" pitchFamily="18" charset="0"/>
+              </a:rPr>
+              <a:t>Lễ</a:t>
+            </a:r>
+            <a:r>
+              <a:rPr lang="en-US" sz="1800" dirty="0">
+                <a:solidFill>
+                  <a:srgbClr val="FF0000"/>
+                </a:solidFill>
+                <a:latin typeface="Times New Roman" panose="02020603050405020304" pitchFamily="18" charset="0"/>
+                <a:cs typeface="Times New Roman" panose="02020603050405020304" pitchFamily="18" charset="0"/>
+              </a:rPr>
+              <a:t>                             </a:t>
+            </a:r>
+            <a:r>
+              <a:rPr lang="en-US" sz="2400" b="1" dirty="0">
+                <a:solidFill>
+                  <a:srgbClr val="FF0000"/>
+                </a:solidFill>
+                <a:effectLst>
+                  <a:outerShdw blurRad="38100" dist="38100" dir="2700000" algn="tl">
+                    <a:srgbClr val="000000">
+                      <a:alpha val="43137"/>
+                    </a:srgbClr>
+                  </a:outerShdw>
+                </a:effectLst>
+                <a:latin typeface="Times New Roman" panose="02020603050405020304" pitchFamily="18" charset="0"/>
+                <a:cs typeface="Times New Roman" panose="02020603050405020304" pitchFamily="18" charset="0"/>
+              </a:rPr>
+              <a:t>TIẾNG KÊU TRONG SA MẠC (KN)</a:t>
+            </a:r>
+            <a:endParaRPr lang="en-US" sz="2400" b="1" dirty="0">
+              <a:solidFill>
+                <a:srgbClr val="FF0000"/>
+              </a:solidFill>
+              <a:effectLst>
+                <a:outerShdw blurRad="38100" dist="38100" dir="2700000" algn="tl">
+                  <a:srgbClr val="000000">
+                    <a:alpha val="43137"/>
+                  </a:srgbClr>
+                </a:outerShdw>
+              </a:effectLst>
+            </a:endParaRPr>
+          </a:p>
+        </p:txBody>
+      </p:sp>
+      <p:sp>
+        <p:nvSpPr>
+          <p:cNvPr id="3" name="Subtitle 2"/>
+          <p:cNvSpPr>
+            <a:spLocks noGrp="1"/>
+          </p:cNvSpPr>
+          <p:nvPr>
+            <p:ph type="subTitle" idx="1"/>
+          </p:nvPr>
+        </p:nvSpPr>
+        <p:spPr>
+          <a:xfrm>
+            <a:off x="0" y="1375825"/>
+            <a:ext cx="9144000" cy="4219339"/>
+          </a:xfrm>
+        </p:spPr>
+        <p:txBody>
+          <a:bodyPr>
+            <a:noAutofit/>
+          </a:bodyPr>
+          <a:lstStyle/>
+          <a:p>
+            <a:pPr algn="just"/>
+            <a:r>
+              <a:rPr lang="vi-VN" sz="5400" b="1" dirty="0">
+                <a:latin typeface="+mj-lt"/>
+              </a:rPr>
+              <a:t>Hãy thống hối ăn năn chừa lỗi, hãy sống cuộc đời đổi mới. Ánh sáng Chúa đưa dìu lối thánh ân tuôn tràn khắp nơi.</a:t>
+            </a:r>
+            <a:endParaRPr lang="vi-VN" sz="5400" b="1" dirty="0">
+              <a:latin typeface="+mj-lt"/>
+              <a:cs typeface="Times New Roman" panose="02020603050405020304" pitchFamily="18" charset="0"/>
+            </a:endParaRPr>
+          </a:p>
+        </p:txBody>
+      </p:sp>
+    </p:spTree>
+    <p:extLst>
+      <p:ext uri="{BB962C8B-B14F-4D97-AF65-F5344CB8AC3E}">
+        <p14:creationId xmlns:p14="http://schemas.microsoft.com/office/powerpoint/2010/main" val="1651510758"/>
+      </p:ext>
+    </p:extLst>
+  </p:cSld>
+  <p:clrMapOvr>
+    <a:masterClrMapping/>
+  </p:clrMapOvr>
+  <p:transition/>
+  <p:timing>
+    <p:tnLst>
+      <p:par>
+        <p:cTn id="1" dur="indefinite" restart="never" nodeType="tmRoot"/>
+      </p:par>
+    </p:tnLst>
+  </p:timing>
+</p:sld>
+</file>
+
+<file path=ppt/slides/slide87.xml><?xml version="1.0" encoding="utf-8"?>
+<p:sld xmlns:a="http://schemas.openxmlformats.org/drawingml/2006/main" xmlns:r="http://schemas.openxmlformats.org/officeDocument/2006/relationships" xmlns:p="http://schemas.openxmlformats.org/presentationml/2006/main">
+  <p:cSld>
+    <p:spTree>
+      <p:nvGrpSpPr>
+        <p:cNvPr id="1" name=""/>
+        <p:cNvGrpSpPr/>
+        <p:nvPr/>
+      </p:nvGrpSpPr>
+      <p:grpSpPr>
+        <a:xfrm>
+          <a:off x="0" y="0"/>
+          <a:ext cx="0" cy="0"/>
+          <a:chOff x="0" y="0"/>
+          <a:chExt cx="0" cy="0"/>
+        </a:xfrm>
+      </p:grpSpPr>
+      <p:sp>
+        <p:nvSpPr>
+          <p:cNvPr id="2" name="Title 1"/>
+          <p:cNvSpPr>
+            <a:spLocks noGrp="1"/>
+          </p:cNvSpPr>
+          <p:nvPr>
+            <p:ph type="ctrTitle"/>
+          </p:nvPr>
+        </p:nvSpPr>
+        <p:spPr>
+          <a:xfrm>
+            <a:off x="0" y="13648"/>
+            <a:ext cx="9144000" cy="533400"/>
+          </a:xfrm>
+        </p:spPr>
+        <p:txBody>
+          <a:bodyPr>
+            <a:normAutofit/>
+          </a:bodyPr>
+          <a:lstStyle/>
+          <a:p>
+            <a:pPr algn="l"/>
+            <a:r>
+              <a:rPr lang="en-US" sz="1800" dirty="0" err="1">
+                <a:solidFill>
+                  <a:srgbClr val="FF0000"/>
+                </a:solidFill>
+                <a:latin typeface="Times New Roman" pitchFamily="18" charset="0"/>
+                <a:cs typeface="Times New Roman" pitchFamily="18" charset="0"/>
+              </a:rPr>
+              <a:t>Kết</a:t>
+            </a:r>
+            <a:r>
+              <a:rPr lang="en-US" sz="1800" dirty="0">
+                <a:solidFill>
+                  <a:srgbClr val="FF0000"/>
+                </a:solidFill>
+                <a:latin typeface="Times New Roman" pitchFamily="18" charset="0"/>
+                <a:cs typeface="Times New Roman" pitchFamily="18" charset="0"/>
+              </a:rPr>
+              <a:t> </a:t>
+            </a:r>
+            <a:r>
+              <a:rPr lang="en-US" sz="1800" dirty="0" err="1">
+                <a:solidFill>
+                  <a:srgbClr val="FF0000"/>
+                </a:solidFill>
+                <a:latin typeface="Times New Roman" pitchFamily="18" charset="0"/>
+                <a:cs typeface="Times New Roman" pitchFamily="18" charset="0"/>
+              </a:rPr>
+              <a:t>Lễ</a:t>
+            </a:r>
+            <a:r>
+              <a:rPr lang="en-US" sz="1800" dirty="0">
+                <a:solidFill>
+                  <a:srgbClr val="FF0000"/>
+                </a:solidFill>
+                <a:latin typeface="Times New Roman" pitchFamily="18" charset="0"/>
+                <a:cs typeface="Times New Roman" pitchFamily="18" charset="0"/>
+              </a:rPr>
+              <a:t>                      </a:t>
+            </a:r>
+            <a:r>
+              <a:rPr lang="vi-VN" sz="1800" dirty="0">
+                <a:solidFill>
+                  <a:srgbClr val="FF0000"/>
+                </a:solidFill>
+                <a:latin typeface="Times New Roman" pitchFamily="18" charset="0"/>
+                <a:cs typeface="Times New Roman" pitchFamily="18" charset="0"/>
+              </a:rPr>
+              <a:t>	    </a:t>
+            </a:r>
+            <a:r>
+              <a:rPr lang="vi-VN" sz="2400" b="1" dirty="0">
+                <a:solidFill>
+                  <a:srgbClr val="FF0000"/>
+                </a:solidFill>
+                <a:effectLst>
+                  <a:outerShdw blurRad="38100" dist="38100" dir="2700000" algn="tl">
+                    <a:srgbClr val="000000">
+                      <a:alpha val="43137"/>
+                    </a:srgbClr>
+                  </a:outerShdw>
+                </a:effectLst>
+                <a:latin typeface="Times New Roman" pitchFamily="18" charset="0"/>
+                <a:cs typeface="Times New Roman" pitchFamily="18" charset="0"/>
+              </a:rPr>
+              <a:t>DÂNG VỀ MẸ (KL)</a:t>
+            </a:r>
+            <a:endParaRPr lang="en-US" sz="2400" b="1" dirty="0">
+              <a:solidFill>
+                <a:srgbClr val="FF0000"/>
+              </a:solidFill>
+              <a:effectLst>
+                <a:outerShdw blurRad="38100" dist="38100" dir="2700000" algn="tl">
+                  <a:srgbClr val="000000">
+                    <a:alpha val="43137"/>
+                  </a:srgbClr>
+                </a:outerShdw>
+              </a:effectLst>
+            </a:endParaRPr>
+          </a:p>
+        </p:txBody>
+      </p:sp>
+      <p:sp>
+        <p:nvSpPr>
+          <p:cNvPr id="3" name="Subtitle 2"/>
+          <p:cNvSpPr>
+            <a:spLocks noGrp="1"/>
+          </p:cNvSpPr>
+          <p:nvPr>
+            <p:ph type="subTitle" idx="1"/>
+          </p:nvPr>
+        </p:nvSpPr>
+        <p:spPr>
+          <a:xfrm>
+            <a:off x="0" y="1265885"/>
+            <a:ext cx="9144000" cy="5810514"/>
+          </a:xfrm>
+        </p:spPr>
+        <p:txBody>
+          <a:bodyPr>
+            <a:noAutofit/>
+          </a:bodyPr>
+          <a:lstStyle/>
+          <a:p>
+            <a:pPr algn="just"/>
+            <a:r>
+              <a:rPr lang="vi-VN" sz="5400" b="1" dirty="0">
+                <a:latin typeface="+mj-lt"/>
+              </a:rPr>
+              <a:t>ĐK. Con dâng về Mẹ một niềm tin yêu bao la, Một lòng cậy trông vàng đá. Dâng lên Mẹ lời kinh như áng hương trầm. Diệu huyền tỏa bay nơi nơi.</a:t>
+            </a:r>
+          </a:p>
+        </p:txBody>
+      </p:sp>
+    </p:spTree>
+    <p:extLst>
+      <p:ext uri="{BB962C8B-B14F-4D97-AF65-F5344CB8AC3E}">
+        <p14:creationId xmlns:p14="http://schemas.microsoft.com/office/powerpoint/2010/main" val="536193845"/>
+      </p:ext>
+    </p:extLst>
+  </p:cSld>
+  <p:clrMapOvr>
+    <a:masterClrMapping/>
+  </p:clrMapOvr>
+  <p:transition/>
+  <p:timing>
+    <p:tnLst>
+      <p:par>
+        <p:cTn id="1" dur="indefinite" restart="never" nodeType="tmRoot"/>
+      </p:par>
+    </p:tnLst>
+  </p:timing>
+</p:sld>
+</file>
+
+<file path=ppt/slides/slide88.xml><?xml version="1.0" encoding="utf-8"?>
+<p:sld xmlns:a="http://schemas.openxmlformats.org/drawingml/2006/main" xmlns:r="http://schemas.openxmlformats.org/officeDocument/2006/relationships" xmlns:p="http://schemas.openxmlformats.org/presentationml/2006/main">
+  <p:cSld>
+    <p:spTree>
+      <p:nvGrpSpPr>
+        <p:cNvPr id="1" name=""/>
+        <p:cNvGrpSpPr/>
+        <p:nvPr/>
+      </p:nvGrpSpPr>
+      <p:grpSpPr>
+        <a:xfrm>
+          <a:off x="0" y="0"/>
+          <a:ext cx="0" cy="0"/>
+          <a:chOff x="0" y="0"/>
+          <a:chExt cx="0" cy="0"/>
+        </a:xfrm>
+      </p:grpSpPr>
+      <p:sp>
+        <p:nvSpPr>
+          <p:cNvPr id="2" name="Title 1"/>
+          <p:cNvSpPr>
+            <a:spLocks noGrp="1"/>
+          </p:cNvSpPr>
+          <p:nvPr>
+            <p:ph type="ctrTitle"/>
+          </p:nvPr>
+        </p:nvSpPr>
+        <p:spPr>
+          <a:xfrm>
+            <a:off x="0" y="13648"/>
+            <a:ext cx="9144000" cy="533400"/>
+          </a:xfrm>
+        </p:spPr>
+        <p:txBody>
+          <a:bodyPr>
+            <a:normAutofit/>
+          </a:bodyPr>
+          <a:lstStyle/>
+          <a:p>
+            <a:pPr algn="l"/>
+            <a:r>
+              <a:rPr lang="en-US" sz="1800" dirty="0" err="1">
+                <a:solidFill>
+                  <a:srgbClr val="FF0000"/>
+                </a:solidFill>
+                <a:latin typeface="Times New Roman" pitchFamily="18" charset="0"/>
+                <a:cs typeface="Times New Roman" pitchFamily="18" charset="0"/>
+              </a:rPr>
+              <a:t>Kết</a:t>
+            </a:r>
+            <a:r>
+              <a:rPr lang="en-US" sz="1800" dirty="0">
+                <a:solidFill>
+                  <a:srgbClr val="FF0000"/>
+                </a:solidFill>
+                <a:latin typeface="Times New Roman" pitchFamily="18" charset="0"/>
+                <a:cs typeface="Times New Roman" pitchFamily="18" charset="0"/>
+              </a:rPr>
+              <a:t> </a:t>
+            </a:r>
+            <a:r>
+              <a:rPr lang="en-US" sz="1800" dirty="0" err="1">
+                <a:solidFill>
+                  <a:srgbClr val="FF0000"/>
+                </a:solidFill>
+                <a:latin typeface="Times New Roman" pitchFamily="18" charset="0"/>
+                <a:cs typeface="Times New Roman" pitchFamily="18" charset="0"/>
+              </a:rPr>
+              <a:t>Lễ</a:t>
+            </a:r>
+            <a:r>
+              <a:rPr lang="en-US" sz="1800" dirty="0">
+                <a:solidFill>
+                  <a:srgbClr val="FF0000"/>
+                </a:solidFill>
+                <a:latin typeface="Times New Roman" pitchFamily="18" charset="0"/>
+                <a:cs typeface="Times New Roman" pitchFamily="18" charset="0"/>
+              </a:rPr>
+              <a:t>                      </a:t>
+            </a:r>
+            <a:r>
+              <a:rPr lang="vi-VN" sz="1800" dirty="0">
+                <a:solidFill>
+                  <a:srgbClr val="FF0000"/>
+                </a:solidFill>
+                <a:latin typeface="Times New Roman" pitchFamily="18" charset="0"/>
+                <a:cs typeface="Times New Roman" pitchFamily="18" charset="0"/>
+              </a:rPr>
+              <a:t>	    </a:t>
+            </a:r>
+            <a:r>
+              <a:rPr lang="vi-VN" sz="2400" b="1" dirty="0">
+                <a:solidFill>
+                  <a:srgbClr val="FF0000"/>
+                </a:solidFill>
+                <a:effectLst>
+                  <a:outerShdw blurRad="38100" dist="38100" dir="2700000" algn="tl">
+                    <a:srgbClr val="000000">
+                      <a:alpha val="43137"/>
+                    </a:srgbClr>
+                  </a:outerShdw>
+                </a:effectLst>
+                <a:latin typeface="Times New Roman" pitchFamily="18" charset="0"/>
+                <a:cs typeface="Times New Roman" pitchFamily="18" charset="0"/>
+              </a:rPr>
+              <a:t>DÂNG VỀ MẸ (KL)</a:t>
+            </a:r>
+            <a:endParaRPr lang="en-US" sz="2400" b="1" dirty="0">
+              <a:solidFill>
+                <a:srgbClr val="FF0000"/>
+              </a:solidFill>
+              <a:effectLst>
+                <a:outerShdw blurRad="38100" dist="38100" dir="2700000" algn="tl">
+                  <a:srgbClr val="000000">
+                    <a:alpha val="43137"/>
+                  </a:srgbClr>
+                </a:outerShdw>
+              </a:effectLst>
+            </a:endParaRPr>
+          </a:p>
+        </p:txBody>
+      </p:sp>
+      <p:sp>
+        <p:nvSpPr>
+          <p:cNvPr id="3" name="Subtitle 2"/>
+          <p:cNvSpPr>
+            <a:spLocks noGrp="1"/>
+          </p:cNvSpPr>
+          <p:nvPr>
+            <p:ph type="subTitle" idx="1"/>
+          </p:nvPr>
+        </p:nvSpPr>
+        <p:spPr>
+          <a:xfrm>
+            <a:off x="0" y="1530000"/>
+            <a:ext cx="9144000" cy="5282285"/>
+          </a:xfrm>
+        </p:spPr>
+        <p:txBody>
+          <a:bodyPr>
+            <a:noAutofit/>
+          </a:bodyPr>
+          <a:lstStyle/>
+          <a:p>
+            <a:pPr algn="just"/>
+            <a:r>
+              <a:rPr lang="en-US" sz="5400" b="1" smtClean="0">
+                <a:latin typeface="Times New Roman" pitchFamily="18" charset="0"/>
+                <a:cs typeface="Times New Roman" pitchFamily="18" charset="0"/>
+              </a:rPr>
+              <a:t>3. Con dâng về Mẹ lời nguyện tình yêu thiết tha. Dù đời phôi pha, tình yêu vẫn luôn đậm đà.</a:t>
+            </a:r>
+            <a:endParaRPr lang="vi-VN" sz="5400" b="1" dirty="0">
+              <a:latin typeface="Times New Roman" pitchFamily="18" charset="0"/>
+              <a:cs typeface="Times New Roman" pitchFamily="18" charset="0"/>
+            </a:endParaRPr>
+          </a:p>
+        </p:txBody>
+      </p:sp>
+    </p:spTree>
+    <p:extLst>
+      <p:ext uri="{BB962C8B-B14F-4D97-AF65-F5344CB8AC3E}">
+        <p14:creationId xmlns:p14="http://schemas.microsoft.com/office/powerpoint/2010/main" val="882410794"/>
+      </p:ext>
+    </p:extLst>
+  </p:cSld>
+  <p:clrMapOvr>
+    <a:masterClrMapping/>
+  </p:clrMapOvr>
+  <p:transition/>
+  <p:timing>
+    <p:tnLst>
+      <p:par>
+        <p:cTn id="1" dur="indefinite" restart="never" nodeType="tmRoot"/>
+      </p:par>
+    </p:tnLst>
+  </p:timing>
+</p:sld>
+</file>
+
+<file path=ppt/slides/slide89.xml><?xml version="1.0" encoding="utf-8"?>
+<p:sld xmlns:a="http://schemas.openxmlformats.org/drawingml/2006/main" xmlns:r="http://schemas.openxmlformats.org/officeDocument/2006/relationships" xmlns:p="http://schemas.openxmlformats.org/presentationml/2006/main">
+  <p:cSld>
+    <p:spTree>
+      <p:nvGrpSpPr>
+        <p:cNvPr id="1" name=""/>
+        <p:cNvGrpSpPr/>
+        <p:nvPr/>
+      </p:nvGrpSpPr>
+      <p:grpSpPr>
+        <a:xfrm>
+          <a:off x="0" y="0"/>
+          <a:ext cx="0" cy="0"/>
+          <a:chOff x="0" y="0"/>
+          <a:chExt cx="0" cy="0"/>
+        </a:xfrm>
+      </p:grpSpPr>
+      <p:sp>
+        <p:nvSpPr>
+          <p:cNvPr id="2" name="Title 1"/>
+          <p:cNvSpPr>
+            <a:spLocks noGrp="1"/>
+          </p:cNvSpPr>
+          <p:nvPr>
+            <p:ph type="ctrTitle"/>
+          </p:nvPr>
+        </p:nvSpPr>
+        <p:spPr>
+          <a:xfrm>
+            <a:off x="0" y="13648"/>
+            <a:ext cx="9144000" cy="533400"/>
+          </a:xfrm>
+        </p:spPr>
+        <p:txBody>
+          <a:bodyPr>
+            <a:normAutofit/>
+          </a:bodyPr>
+          <a:lstStyle/>
+          <a:p>
+            <a:pPr algn="l"/>
+            <a:r>
+              <a:rPr lang="en-US" sz="1800" dirty="0" err="1">
+                <a:solidFill>
+                  <a:srgbClr val="FF0000"/>
+                </a:solidFill>
+                <a:latin typeface="Times New Roman" pitchFamily="18" charset="0"/>
+                <a:cs typeface="Times New Roman" pitchFamily="18" charset="0"/>
+              </a:rPr>
+              <a:t>Kết</a:t>
+            </a:r>
+            <a:r>
+              <a:rPr lang="en-US" sz="1800" dirty="0">
+                <a:solidFill>
+                  <a:srgbClr val="FF0000"/>
+                </a:solidFill>
+                <a:latin typeface="Times New Roman" pitchFamily="18" charset="0"/>
+                <a:cs typeface="Times New Roman" pitchFamily="18" charset="0"/>
+              </a:rPr>
+              <a:t> </a:t>
+            </a:r>
+            <a:r>
+              <a:rPr lang="en-US" sz="1800" dirty="0" err="1">
+                <a:solidFill>
+                  <a:srgbClr val="FF0000"/>
+                </a:solidFill>
+                <a:latin typeface="Times New Roman" pitchFamily="18" charset="0"/>
+                <a:cs typeface="Times New Roman" pitchFamily="18" charset="0"/>
+              </a:rPr>
+              <a:t>Lễ</a:t>
+            </a:r>
+            <a:r>
+              <a:rPr lang="en-US" sz="1800" dirty="0">
+                <a:solidFill>
+                  <a:srgbClr val="FF0000"/>
+                </a:solidFill>
+                <a:latin typeface="Times New Roman" pitchFamily="18" charset="0"/>
+                <a:cs typeface="Times New Roman" pitchFamily="18" charset="0"/>
+              </a:rPr>
+              <a:t>                      </a:t>
+            </a:r>
+            <a:r>
+              <a:rPr lang="vi-VN" sz="1800" dirty="0">
+                <a:solidFill>
+                  <a:srgbClr val="FF0000"/>
+                </a:solidFill>
+                <a:latin typeface="Times New Roman" pitchFamily="18" charset="0"/>
+                <a:cs typeface="Times New Roman" pitchFamily="18" charset="0"/>
+              </a:rPr>
+              <a:t>	    </a:t>
+            </a:r>
+            <a:r>
+              <a:rPr lang="vi-VN" sz="2400" b="1" dirty="0">
+                <a:solidFill>
+                  <a:srgbClr val="FF0000"/>
+                </a:solidFill>
+                <a:effectLst>
+                  <a:outerShdw blurRad="38100" dist="38100" dir="2700000" algn="tl">
+                    <a:srgbClr val="000000">
+                      <a:alpha val="43137"/>
+                    </a:srgbClr>
+                  </a:outerShdw>
+                </a:effectLst>
+                <a:latin typeface="Times New Roman" pitchFamily="18" charset="0"/>
+                <a:cs typeface="Times New Roman" pitchFamily="18" charset="0"/>
+              </a:rPr>
+              <a:t>DÂNG VỀ MẸ (KL)</a:t>
+            </a:r>
+            <a:endParaRPr lang="en-US" sz="2400" b="1" dirty="0">
+              <a:solidFill>
+                <a:srgbClr val="FF0000"/>
+              </a:solidFill>
+              <a:effectLst>
+                <a:outerShdw blurRad="38100" dist="38100" dir="2700000" algn="tl">
+                  <a:srgbClr val="000000">
+                    <a:alpha val="43137"/>
+                  </a:srgbClr>
+                </a:outerShdw>
+              </a:effectLst>
+            </a:endParaRPr>
+          </a:p>
+        </p:txBody>
+      </p:sp>
+      <p:sp>
+        <p:nvSpPr>
+          <p:cNvPr id="3" name="Subtitle 2"/>
+          <p:cNvSpPr>
+            <a:spLocks noGrp="1"/>
+          </p:cNvSpPr>
+          <p:nvPr>
+            <p:ph type="subTitle" idx="1"/>
+          </p:nvPr>
+        </p:nvSpPr>
+        <p:spPr>
+          <a:xfrm>
+            <a:off x="0" y="1265885"/>
+            <a:ext cx="9144000" cy="5810514"/>
+          </a:xfrm>
+        </p:spPr>
+        <p:txBody>
+          <a:bodyPr>
+            <a:noAutofit/>
+          </a:bodyPr>
+          <a:lstStyle/>
+          <a:p>
+            <a:pPr algn="just"/>
+            <a:r>
+              <a:rPr lang="vi-VN" sz="5400" b="1" dirty="0">
+                <a:latin typeface="+mj-lt"/>
+              </a:rPr>
+              <a:t>ĐK. Con dâng về Mẹ một niềm tin yêu bao la, Một lòng cậy trông vàng đá. Dâng lên Mẹ lời kinh như áng hương trầm. Diệu huyền tỏa bay nơi nơi.</a:t>
+            </a:r>
+          </a:p>
+        </p:txBody>
+      </p:sp>
+    </p:spTree>
+    <p:extLst>
+      <p:ext uri="{BB962C8B-B14F-4D97-AF65-F5344CB8AC3E}">
+        <p14:creationId xmlns:p14="http://schemas.microsoft.com/office/powerpoint/2010/main" val="3112850632"/>
+      </p:ext>
+    </p:extLst>
+  </p:cSld>
+  <p:clrMapOvr>
+    <a:masterClrMapping/>
+  </p:clrMapOvr>
+  <p:transition/>
+  <p:timing>
+    <p:tnLst>
+      <p:par>
+        <p:cTn id="1" dur="indefinite" restart="never" nodeType="tmRoot"/>
+      </p:par>
+    </p:tnLst>
+  </p:timing>
 </p:sld>
 </file>
 
@@ -21325,6 +23699,15 @@
           </a:p>
           <a:p>
             <a:pPr algn="l"/>
+            <a:r>
+              <a:rPr lang="vi-VN" sz="4000" b="1" dirty="0">
+                <a:solidFill>
+                  <a:schemeClr val="tx1"/>
+                </a:solidFill>
+                <a:latin typeface="+mj-lt"/>
+              </a:rPr>
+              <a:t/>
+            </a:r>
             <a:br>
               <a:rPr lang="vi-VN" sz="4000" b="1" dirty="0">
                 <a:solidFill>
@@ -21333,6 +23716,14 @@
                 <a:latin typeface="+mj-lt"/>
               </a:rPr>
             </a:br>
+            <a:r>
+              <a:rPr lang="vi-VN" sz="4000" b="1" dirty="0">
+                <a:solidFill>
+                  <a:schemeClr val="tx1"/>
+                </a:solidFill>
+              </a:rPr>
+              <a:t/>
+            </a:r>
             <a:br>
               <a:rPr lang="vi-VN" sz="4000" b="1" dirty="0">
                 <a:solidFill>
@@ -21360,6 +23751,833 @@
   <p:clrMapOvr>
     <a:masterClrMapping/>
   </p:clrMapOvr>
+  <p:timing>
+    <p:tnLst>
+      <p:par>
+        <p:cTn id="1" dur="indefinite" restart="never" nodeType="tmRoot"/>
+      </p:par>
+    </p:tnLst>
+  </p:timing>
+</p:sld>
+</file>
+
+<file path=ppt/slides/slide90.xml><?xml version="1.0" encoding="utf-8"?>
+<p:sld xmlns:a="http://schemas.openxmlformats.org/drawingml/2006/main" xmlns:r="http://schemas.openxmlformats.org/officeDocument/2006/relationships" xmlns:p="http://schemas.openxmlformats.org/presentationml/2006/main">
+  <p:cSld>
+    <p:spTree>
+      <p:nvGrpSpPr>
+        <p:cNvPr id="1" name=""/>
+        <p:cNvGrpSpPr/>
+        <p:nvPr/>
+      </p:nvGrpSpPr>
+      <p:grpSpPr>
+        <a:xfrm>
+          <a:off x="0" y="0"/>
+          <a:ext cx="0" cy="0"/>
+          <a:chOff x="0" y="0"/>
+          <a:chExt cx="0" cy="0"/>
+        </a:xfrm>
+      </p:grpSpPr>
+      <p:sp>
+        <p:nvSpPr>
+          <p:cNvPr id="2" name="Title 1">
+            <a:extLst>
+              <a:ext uri="{FF2B5EF4-FFF2-40B4-BE49-F238E27FC236}">
+                <a16:creationId xmlns:a16="http://schemas.microsoft.com/office/drawing/2014/main" xmlns="" id="{CF08130F-DA6D-4D19-B10C-D85018F22187}"/>
+              </a:ext>
+            </a:extLst>
+          </p:cNvPr>
+          <p:cNvSpPr>
+            <a:spLocks noGrp="1"/>
+          </p:cNvSpPr>
+          <p:nvPr>
+            <p:ph type="title"/>
+          </p:nvPr>
+        </p:nvSpPr>
+        <p:spPr/>
+        <p:txBody>
+          <a:bodyPr/>
+          <a:lstStyle/>
+          <a:p>
+            <a:endParaRPr lang="vi-VN"/>
+          </a:p>
+        </p:txBody>
+      </p:sp>
+      <p:sp>
+        <p:nvSpPr>
+          <p:cNvPr id="3" name="Content Placeholder 2">
+            <a:extLst>
+              <a:ext uri="{FF2B5EF4-FFF2-40B4-BE49-F238E27FC236}">
+                <a16:creationId xmlns:a16="http://schemas.microsoft.com/office/drawing/2014/main" xmlns="" id="{5B67FD08-5E99-410D-AAB1-55A312F1BB99}"/>
+              </a:ext>
+            </a:extLst>
+          </p:cNvPr>
+          <p:cNvSpPr>
+            <a:spLocks noGrp="1"/>
+          </p:cNvSpPr>
+          <p:nvPr>
+            <p:ph idx="1"/>
+          </p:nvPr>
+        </p:nvSpPr>
+        <p:spPr/>
+        <p:txBody>
+          <a:bodyPr/>
+          <a:lstStyle/>
+          <a:p>
+            <a:endParaRPr lang="vi-VN"/>
+          </a:p>
+        </p:txBody>
+      </p:sp>
+    </p:spTree>
+    <p:extLst>
+      <p:ext uri="{BB962C8B-B14F-4D97-AF65-F5344CB8AC3E}">
+        <p14:creationId xmlns:p14="http://schemas.microsoft.com/office/powerpoint/2010/main" val="2825679399"/>
+      </p:ext>
+    </p:extLst>
+  </p:cSld>
+  <p:clrMapOvr>
+    <a:masterClrMapping/>
+  </p:clrMapOvr>
+  <p:timing>
+    <p:tnLst>
+      <p:par>
+        <p:cTn id="1" dur="indefinite" restart="never" nodeType="tmRoot"/>
+      </p:par>
+    </p:tnLst>
+  </p:timing>
+</p:sld>
+</file>
+
+<file path=ppt/slides/slide91.xml><?xml version="1.0" encoding="utf-8"?>
+<p:sld xmlns:a="http://schemas.openxmlformats.org/drawingml/2006/main" xmlns:r="http://schemas.openxmlformats.org/officeDocument/2006/relationships" xmlns:p="http://schemas.openxmlformats.org/presentationml/2006/main">
+  <p:cSld>
+    <p:spTree>
+      <p:nvGrpSpPr>
+        <p:cNvPr id="1" name=""/>
+        <p:cNvGrpSpPr/>
+        <p:nvPr/>
+      </p:nvGrpSpPr>
+      <p:grpSpPr>
+        <a:xfrm>
+          <a:off x="0" y="0"/>
+          <a:ext cx="0" cy="0"/>
+          <a:chOff x="0" y="0"/>
+          <a:chExt cx="0" cy="0"/>
+        </a:xfrm>
+      </p:grpSpPr>
+      <p:sp>
+        <p:nvSpPr>
+          <p:cNvPr id="2" name="Title 1"/>
+          <p:cNvSpPr>
+            <a:spLocks noGrp="1"/>
+          </p:cNvSpPr>
+          <p:nvPr>
+            <p:ph type="ctrTitle"/>
+          </p:nvPr>
+        </p:nvSpPr>
+        <p:spPr>
+          <a:xfrm>
+            <a:off x="0" y="-19009"/>
+            <a:ext cx="9144000" cy="533400"/>
+          </a:xfrm>
+        </p:spPr>
+        <p:txBody>
+          <a:bodyPr>
+            <a:normAutofit/>
+          </a:bodyPr>
+          <a:lstStyle/>
+          <a:p>
+            <a:r>
+              <a:rPr lang="en-US" sz="2400" b="1" dirty="0">
+                <a:solidFill>
+                  <a:srgbClr val="FF0000"/>
+                </a:solidFill>
+                <a:effectLst>
+                  <a:outerShdw blurRad="38100" dist="38100" dir="2700000" algn="tl">
+                    <a:srgbClr val="000000">
+                      <a:alpha val="43137"/>
+                    </a:srgbClr>
+                  </a:outerShdw>
+                </a:effectLst>
+                <a:latin typeface="Times New Roman" panose="02020603050405020304" pitchFamily="18" charset="0"/>
+                <a:cs typeface="Times New Roman" panose="02020603050405020304" pitchFamily="18" charset="0"/>
+              </a:rPr>
+              <a:t>KINH CẦU CHO ĐẠI DỊCH</a:t>
+            </a:r>
+            <a:endParaRPr lang="en-US" sz="2400" b="1" dirty="0">
+              <a:solidFill>
+                <a:srgbClr val="FF0000"/>
+              </a:solidFill>
+              <a:effectLst>
+                <a:outerShdw blurRad="38100" dist="38100" dir="2700000" algn="tl">
+                  <a:srgbClr val="000000">
+                    <a:alpha val="43137"/>
+                  </a:srgbClr>
+                </a:outerShdw>
+              </a:effectLst>
+            </a:endParaRPr>
+          </a:p>
+        </p:txBody>
+      </p:sp>
+      <p:sp>
+        <p:nvSpPr>
+          <p:cNvPr id="3" name="Subtitle 2"/>
+          <p:cNvSpPr>
+            <a:spLocks noGrp="1"/>
+          </p:cNvSpPr>
+          <p:nvPr>
+            <p:ph type="subTitle" idx="1"/>
+          </p:nvPr>
+        </p:nvSpPr>
+        <p:spPr>
+          <a:xfrm>
+            <a:off x="0" y="574548"/>
+            <a:ext cx="9144000" cy="6177534"/>
+          </a:xfrm>
+        </p:spPr>
+        <p:txBody>
+          <a:bodyPr>
+            <a:noAutofit/>
+          </a:bodyPr>
+          <a:lstStyle/>
+          <a:p>
+            <a:pPr algn="just"/>
+            <a:r>
+              <a:rPr lang="vi-VN" sz="5400" b="1" dirty="0">
+                <a:latin typeface="Times New Roman" panose="02020603050405020304" pitchFamily="18" charset="0"/>
+                <a:cs typeface="Times New Roman" panose="02020603050405020304" pitchFamily="18" charset="0"/>
+              </a:rPr>
+              <a:t>Lạy Thiên Chúa Ba Ngôi toàn năng, chúng con đang họp nhau cầu nguyện, tha thiết nài xin cho cơn dịch bệnh mau chấm dứt. Lạy Chúa Cha giàu lòng thương xót, xin nhìn đến nỗi thống khổ của đoàn con trên khắp thế giới, </a:t>
+            </a:r>
+          </a:p>
+        </p:txBody>
+      </p:sp>
+    </p:spTree>
+    <p:extLst>
+      <p:ext uri="{BB962C8B-B14F-4D97-AF65-F5344CB8AC3E}">
+        <p14:creationId xmlns:p14="http://schemas.microsoft.com/office/powerpoint/2010/main" val="668872012"/>
+      </p:ext>
+    </p:extLst>
+  </p:cSld>
+  <p:clrMapOvr>
+    <a:masterClrMapping/>
+  </p:clrMapOvr>
+  <p:transition/>
+  <p:timing>
+    <p:tnLst>
+      <p:par>
+        <p:cTn id="1" dur="indefinite" restart="never" nodeType="tmRoot"/>
+      </p:par>
+    </p:tnLst>
+  </p:timing>
+</p:sld>
+</file>
+
+<file path=ppt/slides/slide92.xml><?xml version="1.0" encoding="utf-8"?>
+<p:sld xmlns:a="http://schemas.openxmlformats.org/drawingml/2006/main" xmlns:r="http://schemas.openxmlformats.org/officeDocument/2006/relationships" xmlns:p="http://schemas.openxmlformats.org/presentationml/2006/main">
+  <p:cSld>
+    <p:spTree>
+      <p:nvGrpSpPr>
+        <p:cNvPr id="1" name=""/>
+        <p:cNvGrpSpPr/>
+        <p:nvPr/>
+      </p:nvGrpSpPr>
+      <p:grpSpPr>
+        <a:xfrm>
+          <a:off x="0" y="0"/>
+          <a:ext cx="0" cy="0"/>
+          <a:chOff x="0" y="0"/>
+          <a:chExt cx="0" cy="0"/>
+        </a:xfrm>
+      </p:grpSpPr>
+      <p:sp>
+        <p:nvSpPr>
+          <p:cNvPr id="2" name="Title 1"/>
+          <p:cNvSpPr>
+            <a:spLocks noGrp="1"/>
+          </p:cNvSpPr>
+          <p:nvPr>
+            <p:ph type="ctrTitle"/>
+          </p:nvPr>
+        </p:nvSpPr>
+        <p:spPr>
+          <a:xfrm>
+            <a:off x="0" y="-19009"/>
+            <a:ext cx="9144000" cy="533400"/>
+          </a:xfrm>
+        </p:spPr>
+        <p:txBody>
+          <a:bodyPr>
+            <a:normAutofit/>
+          </a:bodyPr>
+          <a:lstStyle/>
+          <a:p>
+            <a:r>
+              <a:rPr lang="en-US" sz="2400" b="1" dirty="0">
+                <a:solidFill>
+                  <a:srgbClr val="FF0000"/>
+                </a:solidFill>
+                <a:effectLst>
+                  <a:outerShdw blurRad="38100" dist="38100" dir="2700000" algn="tl">
+                    <a:srgbClr val="000000">
+                      <a:alpha val="43137"/>
+                    </a:srgbClr>
+                  </a:outerShdw>
+                </a:effectLst>
+                <a:latin typeface="Times New Roman" panose="02020603050405020304" pitchFamily="18" charset="0"/>
+                <a:cs typeface="Times New Roman" panose="02020603050405020304" pitchFamily="18" charset="0"/>
+              </a:rPr>
+              <a:t>KINH CẦU CHO ĐẠI DỊCH</a:t>
+            </a:r>
+            <a:endParaRPr lang="en-US" sz="2400" b="1" dirty="0">
+              <a:solidFill>
+                <a:srgbClr val="FF0000"/>
+              </a:solidFill>
+              <a:effectLst>
+                <a:outerShdw blurRad="38100" dist="38100" dir="2700000" algn="tl">
+                  <a:srgbClr val="000000">
+                    <a:alpha val="43137"/>
+                  </a:srgbClr>
+                </a:outerShdw>
+              </a:effectLst>
+            </a:endParaRPr>
+          </a:p>
+        </p:txBody>
+      </p:sp>
+      <p:sp>
+        <p:nvSpPr>
+          <p:cNvPr id="3" name="Subtitle 2"/>
+          <p:cNvSpPr>
+            <a:spLocks noGrp="1"/>
+          </p:cNvSpPr>
+          <p:nvPr>
+            <p:ph type="subTitle" idx="1"/>
+          </p:nvPr>
+        </p:nvSpPr>
+        <p:spPr>
+          <a:xfrm>
+            <a:off x="0" y="574548"/>
+            <a:ext cx="9144000" cy="6177534"/>
+          </a:xfrm>
+        </p:spPr>
+        <p:txBody>
+          <a:bodyPr>
+            <a:noAutofit/>
+          </a:bodyPr>
+          <a:lstStyle/>
+          <a:p>
+            <a:pPr algn="just"/>
+            <a:r>
+              <a:rPr lang="vi-VN" sz="5400" b="1" dirty="0">
+                <a:latin typeface="Times New Roman" panose="02020603050405020304" pitchFamily="18" charset="0"/>
+                <a:cs typeface="Times New Roman" panose="02020603050405020304" pitchFamily="18" charset="0"/>
+              </a:rPr>
+              <a:t>đặc biệt tại những nơi dịch bệnh đang hoành hành. Xin củng cố đức tin của chúng con, cho chúng con hoàn toàn tín thác vào tình yêu quan phòng của Cha. Lạy Chúa Giêsu là Đấng cứu độ duy nhất, </a:t>
+            </a:r>
+          </a:p>
+        </p:txBody>
+      </p:sp>
+    </p:spTree>
+    <p:extLst>
+      <p:ext uri="{BB962C8B-B14F-4D97-AF65-F5344CB8AC3E}">
+        <p14:creationId xmlns:p14="http://schemas.microsoft.com/office/powerpoint/2010/main" val="3254010152"/>
+      </p:ext>
+    </p:extLst>
+  </p:cSld>
+  <p:clrMapOvr>
+    <a:masterClrMapping/>
+  </p:clrMapOvr>
+  <p:transition/>
+  <p:timing>
+    <p:tnLst>
+      <p:par>
+        <p:cTn id="1" dur="indefinite" restart="never" nodeType="tmRoot"/>
+      </p:par>
+    </p:tnLst>
+  </p:timing>
+</p:sld>
+</file>
+
+<file path=ppt/slides/slide93.xml><?xml version="1.0" encoding="utf-8"?>
+<p:sld xmlns:a="http://schemas.openxmlformats.org/drawingml/2006/main" xmlns:r="http://schemas.openxmlformats.org/officeDocument/2006/relationships" xmlns:p="http://schemas.openxmlformats.org/presentationml/2006/main">
+  <p:cSld>
+    <p:spTree>
+      <p:nvGrpSpPr>
+        <p:cNvPr id="1" name=""/>
+        <p:cNvGrpSpPr/>
+        <p:nvPr/>
+      </p:nvGrpSpPr>
+      <p:grpSpPr>
+        <a:xfrm>
+          <a:off x="0" y="0"/>
+          <a:ext cx="0" cy="0"/>
+          <a:chOff x="0" y="0"/>
+          <a:chExt cx="0" cy="0"/>
+        </a:xfrm>
+      </p:grpSpPr>
+      <p:sp>
+        <p:nvSpPr>
+          <p:cNvPr id="2" name="Title 1"/>
+          <p:cNvSpPr>
+            <a:spLocks noGrp="1"/>
+          </p:cNvSpPr>
+          <p:nvPr>
+            <p:ph type="ctrTitle"/>
+          </p:nvPr>
+        </p:nvSpPr>
+        <p:spPr>
+          <a:xfrm>
+            <a:off x="0" y="-19009"/>
+            <a:ext cx="9144000" cy="533400"/>
+          </a:xfrm>
+        </p:spPr>
+        <p:txBody>
+          <a:bodyPr>
+            <a:normAutofit/>
+          </a:bodyPr>
+          <a:lstStyle/>
+          <a:p>
+            <a:r>
+              <a:rPr lang="en-US" sz="2400" b="1" dirty="0">
+                <a:solidFill>
+                  <a:srgbClr val="FF0000"/>
+                </a:solidFill>
+                <a:effectLst>
+                  <a:outerShdw blurRad="38100" dist="38100" dir="2700000" algn="tl">
+                    <a:srgbClr val="000000">
+                      <a:alpha val="43137"/>
+                    </a:srgbClr>
+                  </a:outerShdw>
+                </a:effectLst>
+                <a:latin typeface="Times New Roman" panose="02020603050405020304" pitchFamily="18" charset="0"/>
+                <a:cs typeface="Times New Roman" panose="02020603050405020304" pitchFamily="18" charset="0"/>
+              </a:rPr>
+              <a:t>KINH CẦU CHO ĐẠI DỊCH</a:t>
+            </a:r>
+            <a:endParaRPr lang="en-US" sz="2400" b="1" dirty="0">
+              <a:solidFill>
+                <a:srgbClr val="FF0000"/>
+              </a:solidFill>
+              <a:effectLst>
+                <a:outerShdw blurRad="38100" dist="38100" dir="2700000" algn="tl">
+                  <a:srgbClr val="000000">
+                    <a:alpha val="43137"/>
+                  </a:srgbClr>
+                </a:outerShdw>
+              </a:effectLst>
+            </a:endParaRPr>
+          </a:p>
+        </p:txBody>
+      </p:sp>
+      <p:sp>
+        <p:nvSpPr>
+          <p:cNvPr id="3" name="Subtitle 2"/>
+          <p:cNvSpPr>
+            <a:spLocks noGrp="1"/>
+          </p:cNvSpPr>
+          <p:nvPr>
+            <p:ph type="subTitle" idx="1"/>
+          </p:nvPr>
+        </p:nvSpPr>
+        <p:spPr>
+          <a:xfrm>
+            <a:off x="0" y="574548"/>
+            <a:ext cx="9144000" cy="6177534"/>
+          </a:xfrm>
+        </p:spPr>
+        <p:txBody>
+          <a:bodyPr>
+            <a:noAutofit/>
+          </a:bodyPr>
+          <a:lstStyle/>
+          <a:p>
+            <a:pPr algn="just"/>
+            <a:r>
+              <a:rPr lang="vi-VN" sz="5400" b="1" dirty="0">
+                <a:latin typeface="Times New Roman" panose="02020603050405020304" pitchFamily="18" charset="0"/>
+                <a:cs typeface="Times New Roman" panose="02020603050405020304" pitchFamily="18" charset="0"/>
+              </a:rPr>
+              <a:t>là vị lương y đầy quyền năng và lòng thương xót, xin thương cho các bệnh nhân sớm được chữa lành, và an ủi các gia đình đang gặp khó khăn thử thách. Xin cho lời chúng con khiêm tốn cầu nguyện, </a:t>
+            </a:r>
+          </a:p>
+        </p:txBody>
+      </p:sp>
+    </p:spTree>
+    <p:extLst>
+      <p:ext uri="{BB962C8B-B14F-4D97-AF65-F5344CB8AC3E}">
+        <p14:creationId xmlns:p14="http://schemas.microsoft.com/office/powerpoint/2010/main" val="3272420548"/>
+      </p:ext>
+    </p:extLst>
+  </p:cSld>
+  <p:clrMapOvr>
+    <a:masterClrMapping/>
+  </p:clrMapOvr>
+  <p:transition/>
+</p:sld>
+</file>
+
+<file path=ppt/slides/slide94.xml><?xml version="1.0" encoding="utf-8"?>
+<p:sld xmlns:a="http://schemas.openxmlformats.org/drawingml/2006/main" xmlns:r="http://schemas.openxmlformats.org/officeDocument/2006/relationships" xmlns:p="http://schemas.openxmlformats.org/presentationml/2006/main">
+  <p:cSld>
+    <p:spTree>
+      <p:nvGrpSpPr>
+        <p:cNvPr id="1" name=""/>
+        <p:cNvGrpSpPr/>
+        <p:nvPr/>
+      </p:nvGrpSpPr>
+      <p:grpSpPr>
+        <a:xfrm>
+          <a:off x="0" y="0"/>
+          <a:ext cx="0" cy="0"/>
+          <a:chOff x="0" y="0"/>
+          <a:chExt cx="0" cy="0"/>
+        </a:xfrm>
+      </p:grpSpPr>
+      <p:sp>
+        <p:nvSpPr>
+          <p:cNvPr id="2" name="Title 1"/>
+          <p:cNvSpPr>
+            <a:spLocks noGrp="1"/>
+          </p:cNvSpPr>
+          <p:nvPr>
+            <p:ph type="ctrTitle"/>
+          </p:nvPr>
+        </p:nvSpPr>
+        <p:spPr>
+          <a:xfrm>
+            <a:off x="0" y="-19009"/>
+            <a:ext cx="9144000" cy="533400"/>
+          </a:xfrm>
+        </p:spPr>
+        <p:txBody>
+          <a:bodyPr>
+            <a:normAutofit/>
+          </a:bodyPr>
+          <a:lstStyle/>
+          <a:p>
+            <a:r>
+              <a:rPr lang="en-US" sz="2400" b="1" dirty="0">
+                <a:solidFill>
+                  <a:srgbClr val="FF0000"/>
+                </a:solidFill>
+                <a:effectLst>
+                  <a:outerShdw blurRad="38100" dist="38100" dir="2700000" algn="tl">
+                    <a:srgbClr val="000000">
+                      <a:alpha val="43137"/>
+                    </a:srgbClr>
+                  </a:outerShdw>
+                </a:effectLst>
+                <a:latin typeface="Times New Roman" panose="02020603050405020304" pitchFamily="18" charset="0"/>
+                <a:cs typeface="Times New Roman" panose="02020603050405020304" pitchFamily="18" charset="0"/>
+              </a:rPr>
+              <a:t>KINH CẦU CHO ĐẠI DỊCH</a:t>
+            </a:r>
+            <a:endParaRPr lang="en-US" sz="2400" b="1" dirty="0">
+              <a:solidFill>
+                <a:srgbClr val="FF0000"/>
+              </a:solidFill>
+              <a:effectLst>
+                <a:outerShdw blurRad="38100" dist="38100" dir="2700000" algn="tl">
+                  <a:srgbClr val="000000">
+                    <a:alpha val="43137"/>
+                  </a:srgbClr>
+                </a:outerShdw>
+              </a:effectLst>
+            </a:endParaRPr>
+          </a:p>
+        </p:txBody>
+      </p:sp>
+      <p:sp>
+        <p:nvSpPr>
+          <p:cNvPr id="3" name="Subtitle 2"/>
+          <p:cNvSpPr>
+            <a:spLocks noGrp="1"/>
+          </p:cNvSpPr>
+          <p:nvPr>
+            <p:ph type="subTitle" idx="1"/>
+          </p:nvPr>
+        </p:nvSpPr>
+        <p:spPr>
+          <a:xfrm>
+            <a:off x="0" y="574548"/>
+            <a:ext cx="9144000" cy="6177534"/>
+          </a:xfrm>
+        </p:spPr>
+        <p:txBody>
+          <a:bodyPr>
+            <a:noAutofit/>
+          </a:bodyPr>
+          <a:lstStyle/>
+          <a:p>
+            <a:pPr algn="just"/>
+            <a:r>
+              <a:rPr lang="vi-VN" sz="5400" b="1" dirty="0">
+                <a:latin typeface="Times New Roman" panose="02020603050405020304" pitchFamily="18" charset="0"/>
+                <a:cs typeface="Times New Roman" panose="02020603050405020304" pitchFamily="18" charset="0"/>
+              </a:rPr>
+              <a:t>được chạm tới trái tim nhân lành của Chúa, xin giảm bớt gánh nặng khổ đau, và cho chúng con cảm nhận được bàn tay Chúa đang ân cần nâng đỡ chúng con. Lạy Chúa Thánh Thần là nguồn sức mạnh tình yêu, </a:t>
+            </a:r>
+          </a:p>
+        </p:txBody>
+      </p:sp>
+    </p:spTree>
+    <p:extLst>
+      <p:ext uri="{BB962C8B-B14F-4D97-AF65-F5344CB8AC3E}">
+        <p14:creationId xmlns:p14="http://schemas.microsoft.com/office/powerpoint/2010/main" val="1070452570"/>
+      </p:ext>
+    </p:extLst>
+  </p:cSld>
+  <p:clrMapOvr>
+    <a:masterClrMapping/>
+  </p:clrMapOvr>
+  <p:transition/>
+</p:sld>
+</file>
+
+<file path=ppt/slides/slide95.xml><?xml version="1.0" encoding="utf-8"?>
+<p:sld xmlns:a="http://schemas.openxmlformats.org/drawingml/2006/main" xmlns:r="http://schemas.openxmlformats.org/officeDocument/2006/relationships" xmlns:p="http://schemas.openxmlformats.org/presentationml/2006/main">
+  <p:cSld>
+    <p:spTree>
+      <p:nvGrpSpPr>
+        <p:cNvPr id="1" name=""/>
+        <p:cNvGrpSpPr/>
+        <p:nvPr/>
+      </p:nvGrpSpPr>
+      <p:grpSpPr>
+        <a:xfrm>
+          <a:off x="0" y="0"/>
+          <a:ext cx="0" cy="0"/>
+          <a:chOff x="0" y="0"/>
+          <a:chExt cx="0" cy="0"/>
+        </a:xfrm>
+      </p:grpSpPr>
+      <p:sp>
+        <p:nvSpPr>
+          <p:cNvPr id="2" name="Title 1"/>
+          <p:cNvSpPr>
+            <a:spLocks noGrp="1"/>
+          </p:cNvSpPr>
+          <p:nvPr>
+            <p:ph type="ctrTitle"/>
+          </p:nvPr>
+        </p:nvSpPr>
+        <p:spPr>
+          <a:xfrm>
+            <a:off x="0" y="-19009"/>
+            <a:ext cx="9144000" cy="533400"/>
+          </a:xfrm>
+        </p:spPr>
+        <p:txBody>
+          <a:bodyPr>
+            <a:normAutofit/>
+          </a:bodyPr>
+          <a:lstStyle/>
+          <a:p>
+            <a:r>
+              <a:rPr lang="en-US" sz="2400" b="1" dirty="0">
+                <a:solidFill>
+                  <a:srgbClr val="FF0000"/>
+                </a:solidFill>
+                <a:effectLst>
+                  <a:outerShdw blurRad="38100" dist="38100" dir="2700000" algn="tl">
+                    <a:srgbClr val="000000">
+                      <a:alpha val="43137"/>
+                    </a:srgbClr>
+                  </a:outerShdw>
+                </a:effectLst>
+                <a:latin typeface="Times New Roman" panose="02020603050405020304" pitchFamily="18" charset="0"/>
+                <a:cs typeface="Times New Roman" panose="02020603050405020304" pitchFamily="18" charset="0"/>
+              </a:rPr>
+              <a:t>KINH CẦU CHO ĐẠI DỊCH</a:t>
+            </a:r>
+            <a:endParaRPr lang="en-US" sz="2400" b="1" dirty="0">
+              <a:solidFill>
+                <a:srgbClr val="FF0000"/>
+              </a:solidFill>
+              <a:effectLst>
+                <a:outerShdw blurRad="38100" dist="38100" dir="2700000" algn="tl">
+                  <a:srgbClr val="000000">
+                    <a:alpha val="43137"/>
+                  </a:srgbClr>
+                </a:outerShdw>
+              </a:effectLst>
+            </a:endParaRPr>
+          </a:p>
+        </p:txBody>
+      </p:sp>
+      <p:sp>
+        <p:nvSpPr>
+          <p:cNvPr id="3" name="Subtitle 2"/>
+          <p:cNvSpPr>
+            <a:spLocks noGrp="1"/>
+          </p:cNvSpPr>
+          <p:nvPr>
+            <p:ph type="subTitle" idx="1"/>
+          </p:nvPr>
+        </p:nvSpPr>
+        <p:spPr>
+          <a:xfrm>
+            <a:off x="0" y="574548"/>
+            <a:ext cx="9144000" cy="6177534"/>
+          </a:xfrm>
+        </p:spPr>
+        <p:txBody>
+          <a:bodyPr>
+            <a:noAutofit/>
+          </a:bodyPr>
+          <a:lstStyle/>
+          <a:p>
+            <a:pPr algn="just"/>
+            <a:r>
+              <a:rPr lang="vi-VN" sz="5400" b="1" dirty="0">
+                <a:latin typeface="Times New Roman" panose="02020603050405020304" pitchFamily="18" charset="0"/>
+                <a:cs typeface="Times New Roman" panose="02020603050405020304" pitchFamily="18" charset="0"/>
+              </a:rPr>
+              <a:t>xin soi sáng các vị hữu trách và những người có khả năng, giúp họ sớm tìm ra phương thuốc chữa trị dịch bệnh, xin ban cho các bác sĩ và nhân viên y tế, sức mạnh của tình thương và lòng nhiệt thành quảng đại, </a:t>
+            </a:r>
+          </a:p>
+        </p:txBody>
+      </p:sp>
+    </p:spTree>
+    <p:extLst>
+      <p:ext uri="{BB962C8B-B14F-4D97-AF65-F5344CB8AC3E}">
+        <p14:creationId xmlns:p14="http://schemas.microsoft.com/office/powerpoint/2010/main" val="354398195"/>
+      </p:ext>
+    </p:extLst>
+  </p:cSld>
+  <p:clrMapOvr>
+    <a:masterClrMapping/>
+  </p:clrMapOvr>
+  <p:transition/>
+</p:sld>
+</file>
+
+<file path=ppt/slides/slide96.xml><?xml version="1.0" encoding="utf-8"?>
+<p:sld xmlns:a="http://schemas.openxmlformats.org/drawingml/2006/main" xmlns:r="http://schemas.openxmlformats.org/officeDocument/2006/relationships" xmlns:p="http://schemas.openxmlformats.org/presentationml/2006/main">
+  <p:cSld>
+    <p:spTree>
+      <p:nvGrpSpPr>
+        <p:cNvPr id="1" name=""/>
+        <p:cNvGrpSpPr/>
+        <p:nvPr/>
+      </p:nvGrpSpPr>
+      <p:grpSpPr>
+        <a:xfrm>
+          <a:off x="0" y="0"/>
+          <a:ext cx="0" cy="0"/>
+          <a:chOff x="0" y="0"/>
+          <a:chExt cx="0" cy="0"/>
+        </a:xfrm>
+      </p:grpSpPr>
+      <p:sp>
+        <p:nvSpPr>
+          <p:cNvPr id="2" name="Title 1"/>
+          <p:cNvSpPr>
+            <a:spLocks noGrp="1"/>
+          </p:cNvSpPr>
+          <p:nvPr>
+            <p:ph type="ctrTitle"/>
+          </p:nvPr>
+        </p:nvSpPr>
+        <p:spPr>
+          <a:xfrm>
+            <a:off x="0" y="-19009"/>
+            <a:ext cx="9144000" cy="533400"/>
+          </a:xfrm>
+        </p:spPr>
+        <p:txBody>
+          <a:bodyPr>
+            <a:normAutofit/>
+          </a:bodyPr>
+          <a:lstStyle/>
+          <a:p>
+            <a:r>
+              <a:rPr lang="en-US" sz="2400" b="1" dirty="0">
+                <a:solidFill>
+                  <a:srgbClr val="FF0000"/>
+                </a:solidFill>
+                <a:effectLst>
+                  <a:outerShdw blurRad="38100" dist="38100" dir="2700000" algn="tl">
+                    <a:srgbClr val="000000">
+                      <a:alpha val="43137"/>
+                    </a:srgbClr>
+                  </a:outerShdw>
+                </a:effectLst>
+                <a:latin typeface="Times New Roman" panose="02020603050405020304" pitchFamily="18" charset="0"/>
+                <a:cs typeface="Times New Roman" panose="02020603050405020304" pitchFamily="18" charset="0"/>
+              </a:rPr>
+              <a:t>KINH CẦU CHO ĐẠI DỊCH</a:t>
+            </a:r>
+            <a:endParaRPr lang="en-US" sz="2400" b="1" dirty="0">
+              <a:solidFill>
+                <a:srgbClr val="FF0000"/>
+              </a:solidFill>
+              <a:effectLst>
+                <a:outerShdw blurRad="38100" dist="38100" dir="2700000" algn="tl">
+                  <a:srgbClr val="000000">
+                    <a:alpha val="43137"/>
+                  </a:srgbClr>
+                </a:outerShdw>
+              </a:effectLst>
+            </a:endParaRPr>
+          </a:p>
+        </p:txBody>
+      </p:sp>
+      <p:sp>
+        <p:nvSpPr>
+          <p:cNvPr id="3" name="Subtitle 2"/>
+          <p:cNvSpPr>
+            <a:spLocks noGrp="1"/>
+          </p:cNvSpPr>
+          <p:nvPr>
+            <p:ph type="subTitle" idx="1"/>
+          </p:nvPr>
+        </p:nvSpPr>
+        <p:spPr>
+          <a:xfrm>
+            <a:off x="0" y="574548"/>
+            <a:ext cx="9144000" cy="6177534"/>
+          </a:xfrm>
+        </p:spPr>
+        <p:txBody>
+          <a:bodyPr>
+            <a:noAutofit/>
+          </a:bodyPr>
+          <a:lstStyle/>
+          <a:p>
+            <a:pPr algn="just"/>
+            <a:r>
+              <a:rPr lang="vi-VN" sz="5400" b="1" dirty="0">
+                <a:latin typeface="Times New Roman" panose="02020603050405020304" pitchFamily="18" charset="0"/>
+                <a:cs typeface="Times New Roman" panose="02020603050405020304" pitchFamily="18" charset="0"/>
+              </a:rPr>
+              <a:t>luôn tận tâm tận lực phục vụ các bệnh nhân. Chúng con xin trao vào đôi tay từ mẫu của Mẹ Maria, những lời khẩn nguyện trong cơn đại nạn, nhờ lời Đức Mẹ chuyển cầu, xin Chúa nhận lời chúng con. Amen</a:t>
+            </a:r>
+            <a:r>
+              <a:rPr lang="en-US" sz="5400" b="1" dirty="0">
+                <a:latin typeface="Times New Roman" panose="02020603050405020304" pitchFamily="18" charset="0"/>
+                <a:cs typeface="Times New Roman" panose="02020603050405020304" pitchFamily="18" charset="0"/>
+              </a:rPr>
+              <a:t>.</a:t>
+            </a:r>
+            <a:endParaRPr lang="vi-VN" sz="5400" b="1" dirty="0">
+              <a:latin typeface="Times New Roman" panose="02020603050405020304" pitchFamily="18" charset="0"/>
+              <a:cs typeface="Times New Roman" panose="02020603050405020304" pitchFamily="18" charset="0"/>
+            </a:endParaRPr>
+          </a:p>
+        </p:txBody>
+      </p:sp>
+    </p:spTree>
+    <p:extLst>
+      <p:ext uri="{BB962C8B-B14F-4D97-AF65-F5344CB8AC3E}">
+        <p14:creationId xmlns:p14="http://schemas.microsoft.com/office/powerpoint/2010/main" val="371941318"/>
+      </p:ext>
+    </p:extLst>
+  </p:cSld>
+  <p:clrMapOvr>
+    <a:masterClrMapping/>
+  </p:clrMapOvr>
+  <p:transition/>
 </p:sld>
 </file>
 
@@ -21368,7 +24586,7 @@
   <a:themeElements>
     <a:clrScheme name="Office Theme">
       <a:dk1>
-        <a:sysClr val="windowText" lastClr="000000"/>
+        <a:sysClr val="windowText" lastClr="1F1F1F"/>
       </a:dk1>
       <a:lt1>
         <a:sysClr val="window" lastClr="FFFFFF"/>
@@ -21618,7 +24836,7 @@
   <a:extraClrSchemeLst/>
   <a:extLst>
     <a:ext uri="{05A4C25C-085E-4340-85A3-A5531E510DB2}">
-      <thm15:themeFamily xmlns:thm15="http://schemas.microsoft.com/office/thememl/2012/main" name="Office Theme" id="{62F939B6-93AF-4DB8-9C6B-D6C7DFDC589F}" vid="{4A3C46E8-61CC-4603-A589-7422A47A8E4A}"/>
+      <thm15:themeFamily xmlns:thm15="http://schemas.microsoft.com/office/thememl/2012/main" xmlns="" name="Office Theme" id="{62F939B6-93AF-4DB8-9C6B-D6C7DFDC589F}" vid="{4A3C46E8-61CC-4603-A589-7422A47A8E4A}"/>
     </a:ext>
   </a:extLst>
 </a:theme>
@@ -21629,7 +24847,7 @@
   <a:themeElements>
     <a:clrScheme name="Office">
       <a:dk1>
-        <a:sysClr val="windowText" lastClr="000000"/>
+        <a:sysClr val="windowText" lastClr="1F1F1F"/>
       </a:dk1>
       <a:lt1>
         <a:sysClr val="window" lastClr="FFFFFF"/>
@@ -21879,7 +25097,7 @@
   <a:extraClrSchemeLst/>
   <a:extLst>
     <a:ext uri="{05A4C25C-085E-4340-85A3-A5531E510DB2}">
-      <thm15:themeFamily xmlns:thm15="http://schemas.microsoft.com/office/thememl/2012/main" name="Office Theme" id="{62F939B6-93AF-4DB8-9C6B-D6C7DFDC589F}" vid="{4A3C46E8-61CC-4603-A589-7422A47A8E4A}"/>
+      <thm15:themeFamily xmlns:thm15="http://schemas.microsoft.com/office/thememl/2012/main" xmlns="" name="Office Theme" id="{62F939B6-93AF-4DB8-9C6B-D6C7DFDC589F}" vid="{4A3C46E8-61CC-4603-A589-7422A47A8E4A}"/>
     </a:ext>
   </a:extLst>
 </a:theme>

</xml_diff>